<commit_message>
Adding GUI text interface
</commit_message>
<xml_diff>
--- a/Documentation/Project task 1- group 4.pptx
+++ b/Documentation/Project task 1- group 4.pptx
@@ -11,11 +11,13 @@
     <p:sldId id="264" r:id="rId5"/>
     <p:sldId id="266" r:id="rId6"/>
     <p:sldId id="265" r:id="rId7"/>
-    <p:sldId id="258" r:id="rId8"/>
-    <p:sldId id="259" r:id="rId9"/>
-    <p:sldId id="260" r:id="rId10"/>
-    <p:sldId id="261" r:id="rId11"/>
-    <p:sldId id="262" r:id="rId12"/>
+    <p:sldId id="268" r:id="rId8"/>
+    <p:sldId id="258" r:id="rId9"/>
+    <p:sldId id="259" r:id="rId10"/>
+    <p:sldId id="260" r:id="rId11"/>
+    <p:sldId id="261" r:id="rId12"/>
+    <p:sldId id="262" r:id="rId13"/>
+    <p:sldId id="267" r:id="rId14"/>
   </p:sldIdLst>
   <p:sldSz cx="12192000" cy="6858000"/>
   <p:notesSz cx="6858000" cy="9144000"/>
@@ -114,6 +116,11 @@
       </a:defRPr>
     </a:lvl9pPr>
   </p:defaultTextStyle>
+  <p:extLst>
+    <p:ext uri="{EFAFB233-063F-42B5-8137-9DF3F51BA10A}">
+      <p15:sldGuideLst xmlns:p15="http://schemas.microsoft.com/office/powerpoint/2012/main"/>
+    </p:ext>
+  </p:extLst>
 </p:presentation>
 </file>
 
@@ -2715,7 +2722,7 @@
             <a:rPr lang="en-US" b="0" i="0" dirty="0">
               <a:hlinkClick xmlns:r="http://schemas.openxmlformats.org/officeDocument/2006/relationships" r:id="rId2"/>
             </a:rPr>
-            <a:t>Rename to "Check and place the image in this folder"</a:t>
+            <a:t>Rename to "Check” and place the image in this folder"</a:t>
           </a:r>
           <a:br>
             <a:rPr lang="en-US" b="0" i="0" dirty="0"/>
@@ -3654,7 +3661,7 @@
             <a:rPr lang="en-US" sz="1100" b="0" i="0" kern="1200" dirty="0">
               <a:hlinkClick xmlns:r="http://schemas.openxmlformats.org/officeDocument/2006/relationships" r:id="rId6"/>
             </a:rPr>
-            <a:t>Rename to "Check and place the image in this folder"</a:t>
+            <a:t>Rename to "Check” and place the image in this folder"</a:t>
           </a:r>
           <a:br>
             <a:rPr lang="en-US" sz="1100" b="0" i="0" kern="1200" dirty="0"/>
@@ -6322,7 +6329,7 @@
           <a:p>
             <a:fld id="{72345051-2045-45DA-935E-2E3CA1A69ADC}" type="datetimeFigureOut">
               <a:rPr lang="en-US" smtClean="0"/>
-              <a:t>9/29/2023</a:t>
+              <a:t>9/30/2023</a:t>
             </a:fld>
             <a:endParaRPr lang="en-US" dirty="0"/>
           </a:p>
@@ -6589,7 +6596,7 @@
           <a:p>
             <a:fld id="{72345051-2045-45DA-935E-2E3CA1A69ADC}" type="datetimeFigureOut">
               <a:rPr lang="en-US" smtClean="0"/>
-              <a:t>9/29/2023</a:t>
+              <a:t>9/30/2023</a:t>
             </a:fld>
             <a:endParaRPr lang="en-US" dirty="0"/>
           </a:p>
@@ -6820,7 +6827,7 @@
           <a:p>
             <a:fld id="{72345051-2045-45DA-935E-2E3CA1A69ADC}" type="datetimeFigureOut">
               <a:rPr lang="en-US" smtClean="0"/>
-              <a:t>9/29/2023</a:t>
+              <a:t>9/30/2023</a:t>
             </a:fld>
             <a:endParaRPr lang="en-US" dirty="0"/>
           </a:p>
@@ -7130,7 +7137,7 @@
           <a:p>
             <a:fld id="{72345051-2045-45DA-935E-2E3CA1A69ADC}" type="datetimeFigureOut">
               <a:rPr lang="en-US" smtClean="0"/>
-              <a:t>9/29/2023</a:t>
+              <a:t>9/30/2023</a:t>
             </a:fld>
             <a:endParaRPr lang="en-US" dirty="0"/>
           </a:p>
@@ -7603,7 +7610,7 @@
           <a:p>
             <a:fld id="{72345051-2045-45DA-935E-2E3CA1A69ADC}" type="datetimeFigureOut">
               <a:rPr lang="en-US" smtClean="0"/>
-              <a:t>9/29/2023</a:t>
+              <a:t>9/30/2023</a:t>
             </a:fld>
             <a:endParaRPr lang="en-US" dirty="0"/>
           </a:p>
@@ -8150,7 +8157,7 @@
           <a:p>
             <a:fld id="{72345051-2045-45DA-935E-2E3CA1A69ADC}" type="datetimeFigureOut">
               <a:rPr lang="en-US" smtClean="0"/>
-              <a:t>9/29/2023</a:t>
+              <a:t>9/30/2023</a:t>
             </a:fld>
             <a:endParaRPr lang="en-US" dirty="0"/>
           </a:p>
@@ -8924,7 +8931,7 @@
           <a:p>
             <a:fld id="{72345051-2045-45DA-935E-2E3CA1A69ADC}" type="datetimeFigureOut">
               <a:rPr lang="en-US" smtClean="0"/>
-              <a:t>9/29/2023</a:t>
+              <a:t>9/30/2023</a:t>
             </a:fld>
             <a:endParaRPr lang="en-US" dirty="0"/>
           </a:p>
@@ -9099,7 +9106,7 @@
           <a:p>
             <a:fld id="{72345051-2045-45DA-935E-2E3CA1A69ADC}" type="datetimeFigureOut">
               <a:rPr lang="en-US" smtClean="0"/>
-              <a:t>9/29/2023</a:t>
+              <a:t>9/30/2023</a:t>
             </a:fld>
             <a:endParaRPr lang="en-US"/>
           </a:p>
@@ -9322,7 +9329,7 @@
           <a:p>
             <a:fld id="{72345051-2045-45DA-935E-2E3CA1A69ADC}" type="datetimeFigureOut">
               <a:rPr lang="en-US" smtClean="0"/>
-              <a:t>9/29/2023</a:t>
+              <a:t>9/30/2023</a:t>
             </a:fld>
             <a:endParaRPr lang="en-US"/>
           </a:p>
@@ -9502,7 +9509,7 @@
           <a:p>
             <a:fld id="{72345051-2045-45DA-935E-2E3CA1A69ADC}" type="datetimeFigureOut">
               <a:rPr lang="en-US" smtClean="0"/>
-              <a:t>9/29/2023</a:t>
+              <a:t>9/30/2023</a:t>
             </a:fld>
             <a:endParaRPr lang="en-US"/>
           </a:p>
@@ -9791,7 +9798,7 @@
           <a:p>
             <a:fld id="{72345051-2045-45DA-935E-2E3CA1A69ADC}" type="datetimeFigureOut">
               <a:rPr lang="en-US" smtClean="0"/>
-              <a:t>9/29/2023</a:t>
+              <a:t>9/30/2023</a:t>
             </a:fld>
             <a:endParaRPr lang="en-US"/>
           </a:p>
@@ -10033,7 +10040,7 @@
           <a:p>
             <a:fld id="{72345051-2045-45DA-935E-2E3CA1A69ADC}" type="datetimeFigureOut">
               <a:rPr lang="en-US" smtClean="0"/>
-              <a:t>9/29/2023</a:t>
+              <a:t>9/30/2023</a:t>
             </a:fld>
             <a:endParaRPr lang="en-US"/>
           </a:p>
@@ -10412,7 +10419,7 @@
           <a:p>
             <a:fld id="{72345051-2045-45DA-935E-2E3CA1A69ADC}" type="datetimeFigureOut">
               <a:rPr lang="en-US" smtClean="0"/>
-              <a:t>9/29/2023</a:t>
+              <a:t>9/30/2023</a:t>
             </a:fld>
             <a:endParaRPr lang="en-US"/>
           </a:p>
@@ -10530,7 +10537,7 @@
           <a:p>
             <a:fld id="{72345051-2045-45DA-935E-2E3CA1A69ADC}" type="datetimeFigureOut">
               <a:rPr lang="en-US" smtClean="0"/>
-              <a:t>9/29/2023</a:t>
+              <a:t>9/30/2023</a:t>
             </a:fld>
             <a:endParaRPr lang="en-US"/>
           </a:p>
@@ -10625,7 +10632,7 @@
           <a:p>
             <a:fld id="{72345051-2045-45DA-935E-2E3CA1A69ADC}" type="datetimeFigureOut">
               <a:rPr lang="en-US" smtClean="0"/>
-              <a:t>9/29/2023</a:t>
+              <a:t>9/30/2023</a:t>
             </a:fld>
             <a:endParaRPr lang="en-US"/>
           </a:p>
@@ -10874,7 +10881,7 @@
           <a:p>
             <a:fld id="{72345051-2045-45DA-935E-2E3CA1A69ADC}" type="datetimeFigureOut">
               <a:rPr lang="en-US" smtClean="0"/>
-              <a:t>9/29/2023</a:t>
+              <a:t>9/30/2023</a:t>
             </a:fld>
             <a:endParaRPr lang="en-US"/>
           </a:p>
@@ -11131,7 +11138,7 @@
           <a:p>
             <a:fld id="{72345051-2045-45DA-935E-2E3CA1A69ADC}" type="datetimeFigureOut">
               <a:rPr lang="en-US" smtClean="0"/>
-              <a:t>9/29/2023</a:t>
+              <a:t>9/30/2023</a:t>
             </a:fld>
             <a:endParaRPr lang="en-US"/>
           </a:p>
@@ -11374,7 +11381,7 @@
           <a:p>
             <a:fld id="{72345051-2045-45DA-935E-2E3CA1A69ADC}" type="datetimeFigureOut">
               <a:rPr lang="en-US" smtClean="0"/>
-              <a:t>9/29/2023</a:t>
+              <a:t>9/30/2023</a:t>
             </a:fld>
             <a:endParaRPr lang="en-US" dirty="0"/>
           </a:p>
@@ -11832,7 +11839,7 @@
               </a:spcAft>
             </a:pPr>
             <a:r>
-              <a:rPr lang="en-US" sz="5100" b="1" cap="none" spc="0">
+              <a:rPr lang="en-US" sz="5100" b="1" cap="none" spc="0" dirty="0">
                 <a:ln w="13462">
                   <a:solidFill>
                     <a:schemeClr val="bg1"/>
@@ -11956,7 +11963,7 @@
             </a:r>
             <a:r>
               <a:rPr lang="en-US" dirty="0"/>
-              <a:t> Vinay Kumar ( )</a:t>
+              <a:t> Vinay Kumar (1447125 )</a:t>
             </a:r>
             <a:endParaRPr lang="en-IN" dirty="0"/>
           </a:p>
@@ -11980,33 +11987,9 @@
   <p:cSld>
     <p:bg>
       <p:bgPr>
-        <a:gradFill rotWithShape="1">
-          <a:gsLst>
-            <a:gs pos="0">
-              <a:schemeClr val="bg1">
-                <a:tint val="93000"/>
-                <a:shade val="98000"/>
-                <a:satMod val="150000"/>
-                <a:lumMod val="102000"/>
-              </a:schemeClr>
-            </a:gs>
-            <a:gs pos="50000">
-              <a:schemeClr val="bg1">
-                <a:tint val="98000"/>
-                <a:shade val="90000"/>
-                <a:satMod val="130000"/>
-                <a:lumMod val="103000"/>
-              </a:schemeClr>
-            </a:gs>
-            <a:gs pos="100000">
-              <a:schemeClr val="bg1">
-                <a:shade val="63000"/>
-                <a:satMod val="120000"/>
-              </a:schemeClr>
-            </a:gs>
-          </a:gsLst>
-          <a:lin ang="5400000" scaled="0"/>
-        </a:gradFill>
+        <a:solidFill>
+          <a:schemeClr val="bg1"/>
+        </a:solidFill>
         <a:effectLst/>
       </p:bgPr>
     </p:bg>
@@ -12024,12 +12007,12 @@
           <a:chExt cx="0" cy="0"/>
         </a:xfrm>
       </p:grpSpPr>
-      <p:sp useBgFill="1">
+      <p:sp>
         <p:nvSpPr>
-          <p:cNvPr id="12" name="Rectangle 11">
+          <p:cNvPr id="13" name="Rectangle 12">
             <a:extLst>
               <a:ext uri="{FF2B5EF4-FFF2-40B4-BE49-F238E27FC236}">
-                <a16:creationId xmlns:a16="http://schemas.microsoft.com/office/drawing/2014/main" id="{24C41CF4-4A13-4AA9-9300-CB7A2E37C861}"/>
+                <a16:creationId xmlns:a16="http://schemas.microsoft.com/office/drawing/2014/main" id="{1EA5387D-64D8-4D6C-B109-FF4E81DF609A}"/>
               </a:ext>
               <a:ext uri="{C183D7F6-B498-43B3-948B-1728B52AA6E4}">
                 <adec:decorative xmlns:adec="http://schemas.microsoft.com/office/drawing/2017/decorative" val="1"/>
@@ -12049,16 +12032,18 @@
         </p:nvSpPr>
         <p:spPr>
           <a:xfrm>
-            <a:off x="1" y="0"/>
+            <a:off x="0" y="0"/>
             <a:ext cx="12192000" cy="6858000"/>
           </a:xfrm>
           <a:prstGeom prst="rect">
             <a:avLst/>
           </a:prstGeom>
+          <a:solidFill>
+            <a:schemeClr val="bg1"/>
+          </a:solidFill>
           <a:ln>
             <a:noFill/>
           </a:ln>
-          <a:effectLst/>
         </p:spPr>
         <p:style>
           <a:lnRef idx="2">
@@ -12080,46 +12065,55 @@
           <a:bodyPr rtlCol="0" anchor="ctr"/>
           <a:lstStyle/>
           <a:p>
-            <a:pPr marL="0" marR="0" lvl="0" indent="0" algn="ctr" defTabSz="457200" rtl="0" eaLnBrk="1" fontAlgn="auto" latinLnBrk="0" hangingPunct="1">
-              <a:lnSpc>
-                <a:spcPct val="100000"/>
-              </a:lnSpc>
-              <a:spcBef>
-                <a:spcPts val="0"/>
-              </a:spcBef>
-              <a:spcAft>
-                <a:spcPts val="0"/>
-              </a:spcAft>
-              <a:buClrTx/>
-              <a:buSzTx/>
-              <a:buFontTx/>
-              <a:buNone/>
-              <a:tabLst/>
-              <a:defRPr/>
-            </a:pPr>
-            <a:endParaRPr kumimoji="0" lang="en-US" sz="1800" b="0" i="0" u="none" strike="noStrike" kern="1200" cap="none" spc="0" normalizeH="0" baseline="0" noProof="0">
-              <a:ln>
-                <a:noFill/>
-              </a:ln>
-              <a:solidFill>
-                <a:prstClr val="white"/>
-              </a:solidFill>
-              <a:effectLst/>
-              <a:uLnTx/>
-              <a:uFillTx/>
-              <a:latin typeface="Century Gothic" panose="020B0502020202020204"/>
-              <a:ea typeface="+mn-ea"/>
-              <a:cs typeface="+mn-cs"/>
-            </a:endParaRPr>
+            <a:pPr algn="ctr"/>
+            <a:endParaRPr lang="en-US"/>
           </a:p>
         </p:txBody>
       </p:sp>
+      <p:pic>
+        <p:nvPicPr>
+          <p:cNvPr id="9" name="Picture 8" descr="A group of glowing rings&#10;&#10;Description automatically generated with medium confidence">
+            <a:extLst>
+              <a:ext uri="{FF2B5EF4-FFF2-40B4-BE49-F238E27FC236}">
+                <a16:creationId xmlns:a16="http://schemas.microsoft.com/office/drawing/2014/main" id="{646C0CD6-138A-A71B-744A-E5BCA461E42F}"/>
+              </a:ext>
+            </a:extLst>
+          </p:cNvPr>
+          <p:cNvPicPr>
+            <a:picLocks noChangeAspect="1"/>
+          </p:cNvPicPr>
+          <p:nvPr/>
+        </p:nvPicPr>
+        <p:blipFill rotWithShape="1">
+          <a:blip r:embed="rId2">
+            <a:duotone>
+              <a:schemeClr val="bg2">
+                <a:shade val="45000"/>
+                <a:satMod val="135000"/>
+              </a:schemeClr>
+              <a:prstClr val="white"/>
+            </a:duotone>
+            <a:alphaModFix amt="30000"/>
+          </a:blip>
+          <a:srcRect t="2868" b="13177"/>
+          <a:stretch/>
+        </p:blipFill>
+        <p:spPr>
+          <a:xfrm>
+            <a:off x="20" y="10"/>
+            <a:ext cx="12191980" cy="6857990"/>
+          </a:xfrm>
+          <a:prstGeom prst="rect">
+            <a:avLst/>
+          </a:prstGeom>
+        </p:spPr>
+      </p:pic>
       <p:sp>
         <p:nvSpPr>
           <p:cNvPr id="5" name="TextBox 4">
             <a:extLst>
               <a:ext uri="{FF2B5EF4-FFF2-40B4-BE49-F238E27FC236}">
-                <a16:creationId xmlns:a16="http://schemas.microsoft.com/office/drawing/2014/main" id="{87B5735B-27C8-C265-3C10-5CBE6EB411CE}"/>
+                <a16:creationId xmlns:a16="http://schemas.microsoft.com/office/drawing/2014/main" id="{F3BC1F92-2958-AE2E-B00A-8B98066C68FB}"/>
               </a:ext>
             </a:extLst>
           </p:cNvPr>
@@ -12128,8 +12122,8 @@
         </p:nvSpPr>
         <p:spPr>
           <a:xfrm>
-            <a:off x="683609" y="764372"/>
-            <a:ext cx="3173688" cy="5216013"/>
+            <a:off x="2895600" y="764373"/>
+            <a:ext cx="8610600" cy="1293028"/>
           </a:xfrm>
           <a:prstGeom prst="rect">
             <a:avLst/>
@@ -12159,7 +12153,7 @@
                 <a:ea typeface="+mj-ea"/>
                 <a:cs typeface="+mj-cs"/>
               </a:rPr>
-              <a:t>Visualization and Analysis:</a:t>
+              <a:t>Dynamic Time Warping (DTW):</a:t>
             </a:r>
             <a:endParaRPr lang="en-US" sz="4000" cap="all">
               <a:latin typeface="+mj-lt"/>
@@ -12169,64 +12163,12 @@
           </a:p>
         </p:txBody>
       </p:sp>
-      <p:cxnSp>
-        <p:nvCxnSpPr>
-          <p:cNvPr id="14" name="Straight Connector 13">
+      <p:sp>
+        <p:nvSpPr>
+          <p:cNvPr id="7" name="TextBox 6">
             <a:extLst>
               <a:ext uri="{FF2B5EF4-FFF2-40B4-BE49-F238E27FC236}">
-                <a16:creationId xmlns:a16="http://schemas.microsoft.com/office/drawing/2014/main" id="{7A77B115-9FF3-46AE-AE08-826DEB9A6246}"/>
-              </a:ext>
-              <a:ext uri="{C183D7F6-B498-43B3-948B-1728B52AA6E4}">
-                <adec:decorative xmlns:adec="http://schemas.microsoft.com/office/drawing/2017/decorative" val="1"/>
-              </a:ext>
-            </a:extLst>
-          </p:cNvPr>
-          <p:cNvCxnSpPr>
-            <a:cxnSpLocks noGrp="1" noRot="1" noChangeAspect="1" noMove="1" noResize="1" noEditPoints="1" noAdjustHandles="1" noChangeArrowheads="1" noChangeShapeType="1"/>
-          </p:cNvCxnSpPr>
-          <p:nvPr>
-            <p:extLst>
-              <p:ext uri="{386F3935-93C4-4BCD-93E2-E3B085C9AB24}">
-                <p16:designElem xmlns:p16="http://schemas.microsoft.com/office/powerpoint/2015/main" val="1"/>
-              </p:ext>
-            </p:extLst>
-          </p:nvPr>
-        </p:nvCxnSpPr>
-        <p:spPr>
-          <a:xfrm>
-            <a:off x="4127197" y="1923563"/>
-            <a:ext cx="0" cy="3017520"/>
-          </a:xfrm>
-          <a:prstGeom prst="line">
-            <a:avLst/>
-          </a:prstGeom>
-          <a:ln w="19050">
-            <a:solidFill>
-              <a:schemeClr val="accent1"/>
-            </a:solidFill>
-          </a:ln>
-        </p:spPr>
-        <p:style>
-          <a:lnRef idx="1">
-            <a:schemeClr val="accent1"/>
-          </a:lnRef>
-          <a:fillRef idx="0">
-            <a:schemeClr val="accent1"/>
-          </a:fillRef>
-          <a:effectRef idx="0">
-            <a:schemeClr val="accent1"/>
-          </a:effectRef>
-          <a:fontRef idx="minor">
-            <a:schemeClr val="tx1"/>
-          </a:fontRef>
-        </p:style>
-      </p:cxnSp>
-      <p:sp>
-        <p:nvSpPr>
-          <p:cNvPr id="11" name="TextBox 6">
-            <a:extLst>
-              <a:ext uri="{FF2B5EF4-FFF2-40B4-BE49-F238E27FC236}">
-                <a16:creationId xmlns:a16="http://schemas.microsoft.com/office/drawing/2014/main" id="{121B7A9D-79C1-AF1F-1CF3-2CE04B021D73}"/>
+                <a16:creationId xmlns:a16="http://schemas.microsoft.com/office/drawing/2014/main" id="{80F7466D-9AE1-398B-00AF-5FC9355691A2}"/>
               </a:ext>
             </a:extLst>
           </p:cNvPr>
@@ -12235,16 +12177,16 @@
         </p:nvSpPr>
         <p:spPr>
           <a:xfrm>
-            <a:off x="4370137" y="764372"/>
-            <a:ext cx="7698037" cy="5216013"/>
+            <a:off x="685800" y="2194560"/>
+            <a:ext cx="10820400" cy="4024125"/>
           </a:xfrm>
           <a:prstGeom prst="rect">
             <a:avLst/>
           </a:prstGeom>
         </p:spPr>
         <p:txBody>
-          <a:bodyPr vert="horz" lIns="91440" tIns="45720" rIns="91440" bIns="45720" rtlCol="0" anchor="ctr">
-            <a:normAutofit lnSpcReduction="10000"/>
+          <a:bodyPr vert="horz" lIns="91440" tIns="45720" rIns="91440" bIns="45720" rtlCol="0">
+            <a:normAutofit/>
           </a:bodyPr>
           <a:lstStyle/>
           <a:p>
@@ -12257,8 +12199,8 @@
               </a:spcAft>
             </a:pPr>
             <a:r>
-              <a:rPr lang="en-US" sz="1000" dirty="0"/>
-              <a:t># Inside the loop where you perform shape matching and create the visualization</a:t>
+              <a:rPr lang="en-US" dirty="0"/>
+              <a:t># Function to perform DTW shape matching</a:t>
             </a:r>
           </a:p>
           <a:p>
@@ -12271,32 +12213,32 @@
               </a:spcAft>
             </a:pPr>
             <a:r>
-              <a:rPr lang="en-US" sz="1000" dirty="0"/>
-              <a:t>for </a:t>
-            </a:r>
-            <a:r>
-              <a:rPr lang="en-US" sz="1000" dirty="0" err="1"/>
-              <a:t>template_filename</a:t>
-            </a:r>
-            <a:r>
-              <a:rPr lang="en-US" sz="1000" dirty="0"/>
+              <a:rPr lang="en-US" dirty="0"/>
+              <a:t>def </a:t>
+            </a:r>
+            <a:r>
+              <a:rPr lang="en-US" dirty="0" err="1"/>
+              <a:t>shape_matching</a:t>
+            </a:r>
+            <a:r>
+              <a:rPr lang="en-US" dirty="0"/>
+              <a:t>(</a:t>
+            </a:r>
+            <a:r>
+              <a:rPr lang="en-US" dirty="0" err="1"/>
+              <a:t>template_sequence</a:t>
+            </a:r>
+            <a:r>
+              <a:rPr lang="en-US" dirty="0"/>
               <a:t>, </a:t>
             </a:r>
             <a:r>
-              <a:rPr lang="en-US" sz="1000" dirty="0" err="1"/>
-              <a:t>template_sequence</a:t>
-            </a:r>
-            <a:r>
-              <a:rPr lang="en-US" sz="1000" dirty="0"/>
-              <a:t> in </a:t>
-            </a:r>
-            <a:r>
-              <a:rPr lang="en-US" sz="1000" dirty="0" err="1"/>
-              <a:t>template_sequences.items</a:t>
-            </a:r>
-            <a:r>
-              <a:rPr lang="en-US" sz="1000" dirty="0"/>
-              <a:t>():</a:t>
+              <a:rPr lang="en-US" dirty="0" err="1"/>
+              <a:t>target_sequence</a:t>
+            </a:r>
+            <a:r>
+              <a:rPr lang="en-US" dirty="0"/>
+              <a:t>, threshold):</a:t>
             </a:r>
           </a:p>
           <a:p>
@@ -12309,32 +12251,8 @@
               </a:spcAft>
             </a:pPr>
             <a:r>
-              <a:rPr lang="en-US" sz="1000" dirty="0"/>
-              <a:t>    match, distance, path = </a:t>
-            </a:r>
-            <a:r>
-              <a:rPr lang="en-US" sz="1000" dirty="0" err="1"/>
-              <a:t>shape_matching_with_visualization</a:t>
-            </a:r>
-            <a:r>
-              <a:rPr lang="en-US" sz="1000" dirty="0"/>
-              <a:t>(</a:t>
-            </a:r>
-            <a:r>
-              <a:rPr lang="en-US" sz="1000" dirty="0" err="1"/>
-              <a:t>template_sequence</a:t>
-            </a:r>
-            <a:r>
-              <a:rPr lang="en-US" sz="1000" dirty="0"/>
-              <a:t>, </a:t>
-            </a:r>
-            <a:r>
-              <a:rPr lang="en-US" sz="1000" dirty="0" err="1"/>
-              <a:t>given_sequence</a:t>
-            </a:r>
-            <a:r>
-              <a:rPr lang="en-US" sz="1000" dirty="0"/>
-              <a:t>, threshold=200)</a:t>
+              <a:rPr lang="en-US" dirty="0"/>
+              <a:t>    # Compute the DTW distance between the sequences</a:t>
             </a:r>
           </a:p>
           <a:p>
@@ -12346,7 +12264,34 @@
                 <a:spcPts val="600"/>
               </a:spcAft>
             </a:pPr>
-            <a:endParaRPr lang="en-US" sz="1000" dirty="0"/>
+            <a:r>
+              <a:rPr lang="en-US" dirty="0"/>
+              <a:t>    distance, _ = </a:t>
+            </a:r>
+            <a:r>
+              <a:rPr lang="en-US" dirty="0" err="1"/>
+              <a:t>fastdtw</a:t>
+            </a:r>
+            <a:r>
+              <a:rPr lang="en-US" dirty="0"/>
+              <a:t>(</a:t>
+            </a:r>
+            <a:r>
+              <a:rPr lang="en-US" dirty="0" err="1"/>
+              <a:t>template_sequence</a:t>
+            </a:r>
+            <a:r>
+              <a:rPr lang="en-US" dirty="0"/>
+              <a:t>, </a:t>
+            </a:r>
+            <a:r>
+              <a:rPr lang="en-US" dirty="0" err="1"/>
+              <a:t>target_sequence</a:t>
+            </a:r>
+            <a:r>
+              <a:rPr lang="en-US" dirty="0"/>
+              <a:t>)</a:t>
+            </a:r>
           </a:p>
           <a:p>
             <a:pPr defTabSz="914400">
@@ -12357,10 +12302,7 @@
                 <a:spcPts val="600"/>
               </a:spcAft>
             </a:pPr>
-            <a:r>
-              <a:rPr lang="en-US" sz="1000" dirty="0"/>
-              <a:t>    if match:</a:t>
-            </a:r>
+            <a:endParaRPr lang="en-US" dirty="0"/>
           </a:p>
           <a:p>
             <a:pPr defTabSz="914400">
@@ -12372,8 +12314,8 @@
               </a:spcAft>
             </a:pPr>
             <a:r>
-              <a:rPr lang="en-US" sz="1000" dirty="0"/>
-              <a:t>        # Find peak positions</a:t>
+              <a:rPr lang="en-US" dirty="0"/>
+              <a:t>    if distance &lt; threshold:</a:t>
             </a:r>
           </a:p>
           <a:p>
@@ -12386,32 +12328,8 @@
               </a:spcAft>
             </a:pPr>
             <a:r>
-              <a:rPr lang="en-US" sz="1000" dirty="0"/>
-              <a:t>        </a:t>
-            </a:r>
-            <a:r>
-              <a:rPr lang="en-US" sz="1000" dirty="0" err="1"/>
-              <a:t>max_template_position</a:t>
-            </a:r>
-            <a:r>
-              <a:rPr lang="en-US" sz="1000" dirty="0"/>
-              <a:t> = </a:t>
-            </a:r>
-            <a:r>
-              <a:rPr lang="en-US" sz="1000" dirty="0" err="1"/>
-              <a:t>np.argmax</a:t>
-            </a:r>
-            <a:r>
-              <a:rPr lang="en-US" sz="1000" dirty="0"/>
-              <a:t>(</a:t>
-            </a:r>
-            <a:r>
-              <a:rPr lang="en-US" sz="1000" dirty="0" err="1"/>
-              <a:t>template_sequence</a:t>
-            </a:r>
-            <a:r>
-              <a:rPr lang="en-US" sz="1000" dirty="0"/>
-              <a:t>, axis=0)</a:t>
+              <a:rPr lang="en-US" dirty="0"/>
+              <a:t>        return True, distance</a:t>
             </a:r>
           </a:p>
           <a:p>
@@ -12424,32 +12342,8 @@
               </a:spcAft>
             </a:pPr>
             <a:r>
-              <a:rPr lang="en-US" sz="1000" dirty="0"/>
-              <a:t>        </a:t>
-            </a:r>
-            <a:r>
-              <a:rPr lang="en-US" sz="1000" dirty="0" err="1"/>
-              <a:t>max_given_position</a:t>
-            </a:r>
-            <a:r>
-              <a:rPr lang="en-US" sz="1000" dirty="0"/>
-              <a:t> = </a:t>
-            </a:r>
-            <a:r>
-              <a:rPr lang="en-US" sz="1000" dirty="0" err="1"/>
-              <a:t>np.argmax</a:t>
-            </a:r>
-            <a:r>
-              <a:rPr lang="en-US" sz="1000" dirty="0"/>
-              <a:t>(</a:t>
-            </a:r>
-            <a:r>
-              <a:rPr lang="en-US" sz="1000" dirty="0" err="1"/>
-              <a:t>given_sequence</a:t>
-            </a:r>
-            <a:r>
-              <a:rPr lang="en-US" sz="1000" dirty="0"/>
-              <a:t>, axis=0)</a:t>
+              <a:rPr lang="en-US" dirty="0"/>
+              <a:t>    else:</a:t>
             </a:r>
           </a:p>
           <a:p>
@@ -12462,8 +12356,8 @@
               </a:spcAft>
             </a:pPr>
             <a:r>
-              <a:rPr lang="en-US" sz="1000" dirty="0"/>
-              <a:t>        </a:t>
+              <a:rPr lang="en-US" dirty="0"/>
+              <a:t>        return False, distance</a:t>
             </a:r>
           </a:p>
           <a:p>
@@ -12475,10 +12369,7 @@
                 <a:spcPts val="600"/>
               </a:spcAft>
             </a:pPr>
-            <a:r>
-              <a:rPr lang="en-US" sz="1000" dirty="0"/>
-              <a:t>        # Extract the x and y coordinates of the matched points</a:t>
-            </a:r>
+            <a:endParaRPr lang="en-US" dirty="0"/>
           </a:p>
           <a:p>
             <a:pPr defTabSz="914400">
@@ -12489,42 +12380,7 @@
                 <a:spcPts val="600"/>
               </a:spcAft>
             </a:pPr>
-            <a:r>
-              <a:rPr lang="en-US" sz="1000" dirty="0"/>
-              <a:t>        </a:t>
-            </a:r>
-            <a:r>
-              <a:rPr lang="en-US" sz="1000" dirty="0" err="1"/>
-              <a:t>matched_x</a:t>
-            </a:r>
-            <a:r>
-              <a:rPr lang="en-US" sz="1000" dirty="0"/>
-              <a:t> = [</a:t>
-            </a:r>
-            <a:r>
-              <a:rPr lang="en-US" sz="1000" dirty="0" err="1"/>
-              <a:t>template_sequence</a:t>
-            </a:r>
-            <a:r>
-              <a:rPr lang="en-US" sz="1000" dirty="0"/>
-              <a:t>[</a:t>
-            </a:r>
-            <a:r>
-              <a:rPr lang="en-US" sz="1000" dirty="0" err="1"/>
-              <a:t>i</a:t>
-            </a:r>
-            <a:r>
-              <a:rPr lang="en-US" sz="1000" dirty="0"/>
-              <a:t>, 0] for </a:t>
-            </a:r>
-            <a:r>
-              <a:rPr lang="en-US" sz="1000" dirty="0" err="1"/>
-              <a:t>i</a:t>
-            </a:r>
-            <a:r>
-              <a:rPr lang="en-US" sz="1000" dirty="0"/>
-              <a:t>, _ in path]</a:t>
-            </a:r>
+            <a:endParaRPr lang="en-US" dirty="0"/>
           </a:p>
           <a:p>
             <a:pPr defTabSz="914400">
@@ -12536,390 +12392,19 @@
               </a:spcAft>
             </a:pPr>
             <a:r>
-              <a:rPr lang="en-US" sz="1000" dirty="0"/>
-              <a:t>        </a:t>
-            </a:r>
-            <a:r>
-              <a:rPr lang="en-US" sz="1000" dirty="0" err="1"/>
-              <a:t>matched_y</a:t>
-            </a:r>
-            <a:r>
-              <a:rPr lang="en-US" sz="1000" dirty="0"/>
-              <a:t> = [</a:t>
-            </a:r>
-            <a:r>
-              <a:rPr lang="en-US" sz="1000" dirty="0" err="1"/>
-              <a:t>template_sequence</a:t>
-            </a:r>
-            <a:r>
-              <a:rPr lang="en-US" sz="1000" dirty="0"/>
-              <a:t>[</a:t>
-            </a:r>
-            <a:r>
-              <a:rPr lang="en-US" sz="1000" dirty="0" err="1"/>
-              <a:t>i</a:t>
-            </a:r>
-            <a:r>
-              <a:rPr lang="en-US" sz="1000" dirty="0"/>
-              <a:t>, 1] for </a:t>
-            </a:r>
-            <a:r>
-              <a:rPr lang="en-US" sz="1000" dirty="0" err="1"/>
-              <a:t>i</a:t>
-            </a:r>
-            <a:r>
-              <a:rPr lang="en-US" sz="1000" dirty="0"/>
-              <a:t>, _ in path]</a:t>
-            </a:r>
-          </a:p>
-          <a:p>
-            <a:pPr defTabSz="914400">
-              <a:lnSpc>
-                <a:spcPct val="90000"/>
-              </a:lnSpc>
-              <a:spcAft>
-                <a:spcPts val="600"/>
-              </a:spcAft>
-            </a:pPr>
-            <a:r>
-              <a:rPr lang="en-US" sz="1000" dirty="0"/>
-              <a:t>        </a:t>
-            </a:r>
-          </a:p>
-          <a:p>
-            <a:pPr defTabSz="914400">
-              <a:lnSpc>
-                <a:spcPct val="90000"/>
-              </a:lnSpc>
-              <a:spcAft>
-                <a:spcPts val="600"/>
-              </a:spcAft>
-            </a:pPr>
-            <a:r>
-              <a:rPr lang="en-US" sz="1000" dirty="0"/>
-              <a:t>        # Plot the sequences and highlight the matched points</a:t>
-            </a:r>
-          </a:p>
-          <a:p>
-            <a:pPr defTabSz="914400">
-              <a:lnSpc>
-                <a:spcPct val="90000"/>
-              </a:lnSpc>
-              <a:spcAft>
-                <a:spcPts val="600"/>
-              </a:spcAft>
-            </a:pPr>
-            <a:r>
-              <a:rPr lang="en-US" sz="1000" dirty="0"/>
-              <a:t>        </a:t>
-            </a:r>
-            <a:r>
-              <a:rPr lang="en-US" sz="1000" dirty="0" err="1"/>
-              <a:t>plt.figure</a:t>
-            </a:r>
-            <a:r>
-              <a:rPr lang="en-US" sz="1000" dirty="0"/>
-              <a:t>(</a:t>
-            </a:r>
-            <a:r>
-              <a:rPr lang="en-US" sz="1000" dirty="0" err="1"/>
-              <a:t>figsize</a:t>
-            </a:r>
-            <a:r>
-              <a:rPr lang="en-US" sz="1000" dirty="0"/>
-              <a:t>=(8, 4))</a:t>
-            </a:r>
-          </a:p>
-          <a:p>
-            <a:pPr defTabSz="914400">
-              <a:lnSpc>
-                <a:spcPct val="90000"/>
-              </a:lnSpc>
-              <a:spcAft>
-                <a:spcPts val="600"/>
-              </a:spcAft>
-            </a:pPr>
-            <a:r>
-              <a:rPr lang="en-US" sz="1000" dirty="0"/>
-              <a:t>        </a:t>
-            </a:r>
-            <a:r>
-              <a:rPr lang="en-US" sz="1000" dirty="0" err="1"/>
-              <a:t>plt.plot</a:t>
-            </a:r>
-            <a:r>
-              <a:rPr lang="en-US" sz="1000" dirty="0"/>
-              <a:t>(</a:t>
-            </a:r>
-            <a:r>
-              <a:rPr lang="en-US" sz="1000" dirty="0" err="1"/>
-              <a:t>template_sequence</a:t>
-            </a:r>
-            <a:r>
-              <a:rPr lang="en-US" sz="1000" dirty="0"/>
-              <a:t>[:, 0], </a:t>
-            </a:r>
-            <a:r>
-              <a:rPr lang="en-US" sz="1000" dirty="0" err="1"/>
-              <a:t>template_sequence</a:t>
-            </a:r>
-            <a:r>
-              <a:rPr lang="en-US" sz="1000" dirty="0"/>
-              <a:t>[:, 1], label='Template Sequence', marker='o', </a:t>
-            </a:r>
-            <a:r>
-              <a:rPr lang="en-US" sz="1000" dirty="0" err="1"/>
-              <a:t>markersize</a:t>
-            </a:r>
-            <a:r>
-              <a:rPr lang="en-US" sz="1000" dirty="0"/>
-              <a:t>=5)</a:t>
-            </a:r>
-          </a:p>
-          <a:p>
-            <a:pPr defTabSz="914400">
-              <a:lnSpc>
-                <a:spcPct val="90000"/>
-              </a:lnSpc>
-              <a:spcAft>
-                <a:spcPts val="600"/>
-              </a:spcAft>
-            </a:pPr>
-            <a:r>
-              <a:rPr lang="en-US" sz="1000" dirty="0"/>
-              <a:t>        </a:t>
-            </a:r>
-            <a:r>
-              <a:rPr lang="en-US" sz="1000" dirty="0" err="1"/>
-              <a:t>plt.plot</a:t>
-            </a:r>
-            <a:r>
-              <a:rPr lang="en-US" sz="1000" dirty="0"/>
-              <a:t>(</a:t>
-            </a:r>
-            <a:r>
-              <a:rPr lang="en-US" sz="1000" dirty="0" err="1"/>
-              <a:t>given_sequence</a:t>
-            </a:r>
-            <a:r>
-              <a:rPr lang="en-US" sz="1000" dirty="0"/>
-              <a:t>[:, 0], </a:t>
-            </a:r>
-            <a:r>
-              <a:rPr lang="en-US" sz="1000" dirty="0" err="1"/>
-              <a:t>given_sequence</a:t>
-            </a:r>
-            <a:r>
-              <a:rPr lang="en-US" sz="1000" dirty="0"/>
-              <a:t>[:, 1], label='Given Sequence', marker='x', </a:t>
-            </a:r>
-            <a:r>
-              <a:rPr lang="en-US" sz="1000" dirty="0" err="1"/>
-              <a:t>markersize</a:t>
-            </a:r>
-            <a:r>
-              <a:rPr lang="en-US" sz="1000" dirty="0"/>
-              <a:t>=5)</a:t>
-            </a:r>
-          </a:p>
-          <a:p>
-            <a:pPr defTabSz="914400">
-              <a:lnSpc>
-                <a:spcPct val="90000"/>
-              </a:lnSpc>
-              <a:spcAft>
-                <a:spcPts val="600"/>
-              </a:spcAft>
-            </a:pPr>
-            <a:r>
-              <a:rPr lang="en-US" sz="1000" dirty="0"/>
-              <a:t>        </a:t>
-            </a:r>
-            <a:r>
-              <a:rPr lang="en-US" sz="1000" dirty="0" err="1"/>
-              <a:t>plt.scatter</a:t>
-            </a:r>
-            <a:r>
-              <a:rPr lang="en-US" sz="1000" dirty="0"/>
-              <a:t>(</a:t>
-            </a:r>
-            <a:r>
-              <a:rPr lang="en-US" sz="1000" dirty="0" err="1"/>
-              <a:t>matched_x</a:t>
-            </a:r>
-            <a:r>
-              <a:rPr lang="en-US" sz="1000" dirty="0"/>
-              <a:t>, </a:t>
-            </a:r>
-            <a:r>
-              <a:rPr lang="en-US" sz="1000" dirty="0" err="1"/>
-              <a:t>matched_y</a:t>
-            </a:r>
-            <a:r>
-              <a:rPr lang="en-US" sz="1000" dirty="0"/>
-              <a:t>, c='r', label='Matched Points')  # Plot matched points in red</a:t>
-            </a:r>
-          </a:p>
-          <a:p>
-            <a:pPr defTabSz="914400">
-              <a:lnSpc>
-                <a:spcPct val="90000"/>
-              </a:lnSpc>
-              <a:spcAft>
-                <a:spcPts val="600"/>
-              </a:spcAft>
-            </a:pPr>
-            <a:r>
-              <a:rPr lang="en-US" sz="1000" dirty="0"/>
-              <a:t>        </a:t>
-            </a:r>
-            <a:r>
-              <a:rPr lang="en-US" sz="1000" dirty="0" err="1"/>
-              <a:t>plt.legend</a:t>
-            </a:r>
-            <a:r>
-              <a:rPr lang="en-US" sz="1000" dirty="0"/>
-              <a:t>()</a:t>
-            </a:r>
-          </a:p>
-          <a:p>
-            <a:pPr defTabSz="914400">
-              <a:lnSpc>
-                <a:spcPct val="90000"/>
-              </a:lnSpc>
-              <a:spcAft>
-                <a:spcPts val="600"/>
-              </a:spcAft>
-            </a:pPr>
-            <a:r>
-              <a:rPr lang="en-US" sz="1000" dirty="0"/>
-              <a:t>        </a:t>
-            </a:r>
-            <a:r>
-              <a:rPr lang="en-US" sz="1000" dirty="0" err="1"/>
-              <a:t>plt.title</a:t>
-            </a:r>
-            <a:r>
-              <a:rPr lang="en-US" sz="1000" dirty="0"/>
-              <a:t>(</a:t>
-            </a:r>
-            <a:r>
-              <a:rPr lang="en-US" sz="1000" dirty="0" err="1"/>
-              <a:t>f"Matching</a:t>
-            </a:r>
-            <a:r>
-              <a:rPr lang="en-US" sz="1000" dirty="0"/>
-              <a:t> Result with {</a:t>
-            </a:r>
-            <a:r>
-              <a:rPr lang="en-US" sz="1000" dirty="0" err="1"/>
-              <a:t>template_filename</a:t>
-            </a:r>
-            <a:r>
-              <a:rPr lang="en-US" sz="1000" dirty="0"/>
-              <a:t>} (DTW Distance: {distance})")</a:t>
-            </a:r>
-          </a:p>
-          <a:p>
-            <a:pPr defTabSz="914400">
-              <a:lnSpc>
-                <a:spcPct val="90000"/>
-              </a:lnSpc>
-              <a:spcAft>
-                <a:spcPts val="600"/>
-              </a:spcAft>
-            </a:pPr>
-            <a:r>
-              <a:rPr lang="en-US" sz="1000" dirty="0"/>
-              <a:t>        </a:t>
-            </a:r>
-            <a:r>
-              <a:rPr lang="en-US" sz="1000" dirty="0" err="1"/>
-              <a:t>plt.xlabel</a:t>
-            </a:r>
-            <a:r>
-              <a:rPr lang="en-US" sz="1000" dirty="0"/>
-              <a:t>("X")</a:t>
-            </a:r>
-          </a:p>
-          <a:p>
-            <a:pPr defTabSz="914400">
-              <a:lnSpc>
-                <a:spcPct val="90000"/>
-              </a:lnSpc>
-              <a:spcAft>
-                <a:spcPts val="600"/>
-              </a:spcAft>
-            </a:pPr>
-            <a:r>
-              <a:rPr lang="en-US" sz="1000" dirty="0"/>
-              <a:t>        </a:t>
-            </a:r>
-            <a:r>
-              <a:rPr lang="en-US" sz="1000" dirty="0" err="1"/>
-              <a:t>plt.ylabel</a:t>
-            </a:r>
-            <a:r>
-              <a:rPr lang="en-US" sz="1000" dirty="0"/>
-              <a:t>("Y")</a:t>
-            </a:r>
-          </a:p>
-          <a:p>
-            <a:pPr defTabSz="914400">
-              <a:lnSpc>
-                <a:spcPct val="90000"/>
-              </a:lnSpc>
-              <a:spcAft>
-                <a:spcPts val="600"/>
-              </a:spcAft>
-            </a:pPr>
-            <a:r>
-              <a:rPr lang="en-US" sz="1000" dirty="0"/>
-              <a:t>        </a:t>
-            </a:r>
-            <a:r>
-              <a:rPr lang="en-US" sz="1000" dirty="0" err="1"/>
-              <a:t>plt.show</a:t>
-            </a:r>
-            <a:r>
-              <a:rPr lang="en-US" sz="1000" dirty="0"/>
-              <a:t>()</a:t>
-            </a:r>
-          </a:p>
-          <a:p>
-            <a:pPr defTabSz="914400">
-              <a:lnSpc>
-                <a:spcPct val="90000"/>
-              </a:lnSpc>
-              <a:spcAft>
-                <a:spcPts val="600"/>
-              </a:spcAft>
-            </a:pPr>
-            <a:endParaRPr lang="en-US" sz="1000" dirty="0"/>
-          </a:p>
-          <a:p>
-            <a:pPr defTabSz="914400">
-              <a:lnSpc>
-                <a:spcPct val="90000"/>
-              </a:lnSpc>
-              <a:spcAft>
-                <a:spcPts val="600"/>
-              </a:spcAft>
-            </a:pPr>
-            <a:r>
-              <a:rPr lang="en-US" sz="1000" dirty="0">
-                <a:hlinkClick r:id="rId2"/>
+              <a:rPr lang="en-US" dirty="0">
+                <a:hlinkClick r:id="rId3"/>
               </a:rPr>
               <a:t>GITHUB Link</a:t>
             </a:r>
-            <a:endParaRPr lang="en-US" sz="1000" dirty="0"/>
+            <a:endParaRPr lang="en-US" dirty="0"/>
           </a:p>
         </p:txBody>
       </p:sp>
     </p:spTree>
     <p:extLst>
       <p:ext uri="{BB962C8B-B14F-4D97-AF65-F5344CB8AC3E}">
-        <p14:creationId xmlns:p14="http://schemas.microsoft.com/office/powerpoint/2010/main" val="2815950642"/>
+        <p14:creationId xmlns:p14="http://schemas.microsoft.com/office/powerpoint/2010/main" val="3988142864"/>
       </p:ext>
     </p:extLst>
   </p:cSld>
@@ -13073,6 +12558,960 @@
           <p:cNvPr id="5" name="TextBox 4">
             <a:extLst>
               <a:ext uri="{FF2B5EF4-FFF2-40B4-BE49-F238E27FC236}">
+                <a16:creationId xmlns:a16="http://schemas.microsoft.com/office/drawing/2014/main" id="{87B5735B-27C8-C265-3C10-5CBE6EB411CE}"/>
+              </a:ext>
+            </a:extLst>
+          </p:cNvPr>
+          <p:cNvSpPr txBox="1"/>
+          <p:nvPr/>
+        </p:nvSpPr>
+        <p:spPr>
+          <a:xfrm>
+            <a:off x="683609" y="764372"/>
+            <a:ext cx="3173688" cy="5216013"/>
+          </a:xfrm>
+          <a:prstGeom prst="rect">
+            <a:avLst/>
+          </a:prstGeom>
+        </p:spPr>
+        <p:txBody>
+          <a:bodyPr vert="horz" lIns="91440" tIns="45720" rIns="91440" bIns="45720" rtlCol="0" anchor="ctr">
+            <a:normAutofit/>
+          </a:bodyPr>
+          <a:lstStyle/>
+          <a:p>
+            <a:pPr algn="r" defTabSz="914400">
+              <a:lnSpc>
+                <a:spcPct val="90000"/>
+              </a:lnSpc>
+              <a:spcBef>
+                <a:spcPct val="0"/>
+              </a:spcBef>
+              <a:spcAft>
+                <a:spcPts val="600"/>
+              </a:spcAft>
+            </a:pPr>
+            <a:r>
+              <a:rPr lang="en-US" sz="4000" b="1" i="0" cap="all">
+                <a:effectLst/>
+                <a:latin typeface="+mj-lt"/>
+                <a:ea typeface="+mj-ea"/>
+                <a:cs typeface="+mj-cs"/>
+              </a:rPr>
+              <a:t>Visualization and Analysis:</a:t>
+            </a:r>
+            <a:endParaRPr lang="en-US" sz="4000" cap="all">
+              <a:latin typeface="+mj-lt"/>
+              <a:ea typeface="+mj-ea"/>
+              <a:cs typeface="+mj-cs"/>
+            </a:endParaRPr>
+          </a:p>
+        </p:txBody>
+      </p:sp>
+      <p:cxnSp>
+        <p:nvCxnSpPr>
+          <p:cNvPr id="14" name="Straight Connector 13">
+            <a:extLst>
+              <a:ext uri="{FF2B5EF4-FFF2-40B4-BE49-F238E27FC236}">
+                <a16:creationId xmlns:a16="http://schemas.microsoft.com/office/drawing/2014/main" id="{7A77B115-9FF3-46AE-AE08-826DEB9A6246}"/>
+              </a:ext>
+              <a:ext uri="{C183D7F6-B498-43B3-948B-1728B52AA6E4}">
+                <adec:decorative xmlns:adec="http://schemas.microsoft.com/office/drawing/2017/decorative" val="1"/>
+              </a:ext>
+            </a:extLst>
+          </p:cNvPr>
+          <p:cNvCxnSpPr>
+            <a:cxnSpLocks noGrp="1" noRot="1" noChangeAspect="1" noMove="1" noResize="1" noEditPoints="1" noAdjustHandles="1" noChangeArrowheads="1" noChangeShapeType="1"/>
+          </p:cNvCxnSpPr>
+          <p:nvPr>
+            <p:extLst>
+              <p:ext uri="{386F3935-93C4-4BCD-93E2-E3B085C9AB24}">
+                <p16:designElem xmlns:p16="http://schemas.microsoft.com/office/powerpoint/2015/main" val="1"/>
+              </p:ext>
+            </p:extLst>
+          </p:nvPr>
+        </p:nvCxnSpPr>
+        <p:spPr>
+          <a:xfrm>
+            <a:off x="4127197" y="1923563"/>
+            <a:ext cx="0" cy="3017520"/>
+          </a:xfrm>
+          <a:prstGeom prst="line">
+            <a:avLst/>
+          </a:prstGeom>
+          <a:ln w="19050">
+            <a:solidFill>
+              <a:schemeClr val="accent1"/>
+            </a:solidFill>
+          </a:ln>
+        </p:spPr>
+        <p:style>
+          <a:lnRef idx="1">
+            <a:schemeClr val="accent1"/>
+          </a:lnRef>
+          <a:fillRef idx="0">
+            <a:schemeClr val="accent1"/>
+          </a:fillRef>
+          <a:effectRef idx="0">
+            <a:schemeClr val="accent1"/>
+          </a:effectRef>
+          <a:fontRef idx="minor">
+            <a:schemeClr val="tx1"/>
+          </a:fontRef>
+        </p:style>
+      </p:cxnSp>
+      <p:sp>
+        <p:nvSpPr>
+          <p:cNvPr id="11" name="TextBox 6">
+            <a:extLst>
+              <a:ext uri="{FF2B5EF4-FFF2-40B4-BE49-F238E27FC236}">
+                <a16:creationId xmlns:a16="http://schemas.microsoft.com/office/drawing/2014/main" id="{121B7A9D-79C1-AF1F-1CF3-2CE04B021D73}"/>
+              </a:ext>
+            </a:extLst>
+          </p:cNvPr>
+          <p:cNvSpPr txBox="1"/>
+          <p:nvPr/>
+        </p:nvSpPr>
+        <p:spPr>
+          <a:xfrm>
+            <a:off x="4370137" y="764372"/>
+            <a:ext cx="7698037" cy="5216013"/>
+          </a:xfrm>
+          <a:prstGeom prst="rect">
+            <a:avLst/>
+          </a:prstGeom>
+        </p:spPr>
+        <p:txBody>
+          <a:bodyPr vert="horz" lIns="91440" tIns="45720" rIns="91440" bIns="45720" rtlCol="0" anchor="ctr">
+            <a:normAutofit lnSpcReduction="10000"/>
+          </a:bodyPr>
+          <a:lstStyle/>
+          <a:p>
+            <a:pPr defTabSz="914400">
+              <a:lnSpc>
+                <a:spcPct val="90000"/>
+              </a:lnSpc>
+              <a:spcAft>
+                <a:spcPts val="600"/>
+              </a:spcAft>
+            </a:pPr>
+            <a:r>
+              <a:rPr lang="en-US" sz="1000" dirty="0"/>
+              <a:t># Inside the loop where you perform shape matching and create the visualization</a:t>
+            </a:r>
+          </a:p>
+          <a:p>
+            <a:pPr defTabSz="914400">
+              <a:lnSpc>
+                <a:spcPct val="90000"/>
+              </a:lnSpc>
+              <a:spcAft>
+                <a:spcPts val="600"/>
+              </a:spcAft>
+            </a:pPr>
+            <a:r>
+              <a:rPr lang="en-US" sz="1000" dirty="0"/>
+              <a:t>for </a:t>
+            </a:r>
+            <a:r>
+              <a:rPr lang="en-US" sz="1000" dirty="0" err="1"/>
+              <a:t>template_filename</a:t>
+            </a:r>
+            <a:r>
+              <a:rPr lang="en-US" sz="1000" dirty="0"/>
+              <a:t>, </a:t>
+            </a:r>
+            <a:r>
+              <a:rPr lang="en-US" sz="1000" dirty="0" err="1"/>
+              <a:t>template_sequence</a:t>
+            </a:r>
+            <a:r>
+              <a:rPr lang="en-US" sz="1000" dirty="0"/>
+              <a:t> in </a:t>
+            </a:r>
+            <a:r>
+              <a:rPr lang="en-US" sz="1000" dirty="0" err="1"/>
+              <a:t>template_sequences.items</a:t>
+            </a:r>
+            <a:r>
+              <a:rPr lang="en-US" sz="1000" dirty="0"/>
+              <a:t>():</a:t>
+            </a:r>
+          </a:p>
+          <a:p>
+            <a:pPr defTabSz="914400">
+              <a:lnSpc>
+                <a:spcPct val="90000"/>
+              </a:lnSpc>
+              <a:spcAft>
+                <a:spcPts val="600"/>
+              </a:spcAft>
+            </a:pPr>
+            <a:r>
+              <a:rPr lang="en-US" sz="1000" dirty="0"/>
+              <a:t>    match, distance, path = </a:t>
+            </a:r>
+            <a:r>
+              <a:rPr lang="en-US" sz="1000" dirty="0" err="1"/>
+              <a:t>shape_matching_with_visualization</a:t>
+            </a:r>
+            <a:r>
+              <a:rPr lang="en-US" sz="1000" dirty="0"/>
+              <a:t>(</a:t>
+            </a:r>
+            <a:r>
+              <a:rPr lang="en-US" sz="1000" dirty="0" err="1"/>
+              <a:t>template_sequence</a:t>
+            </a:r>
+            <a:r>
+              <a:rPr lang="en-US" sz="1000" dirty="0"/>
+              <a:t>, </a:t>
+            </a:r>
+            <a:r>
+              <a:rPr lang="en-US" sz="1000" dirty="0" err="1"/>
+              <a:t>given_sequence</a:t>
+            </a:r>
+            <a:r>
+              <a:rPr lang="en-US" sz="1000" dirty="0"/>
+              <a:t>, threshold=200)</a:t>
+            </a:r>
+          </a:p>
+          <a:p>
+            <a:pPr defTabSz="914400">
+              <a:lnSpc>
+                <a:spcPct val="90000"/>
+              </a:lnSpc>
+              <a:spcAft>
+                <a:spcPts val="600"/>
+              </a:spcAft>
+            </a:pPr>
+            <a:endParaRPr lang="en-US" sz="1000" dirty="0"/>
+          </a:p>
+          <a:p>
+            <a:pPr defTabSz="914400">
+              <a:lnSpc>
+                <a:spcPct val="90000"/>
+              </a:lnSpc>
+              <a:spcAft>
+                <a:spcPts val="600"/>
+              </a:spcAft>
+            </a:pPr>
+            <a:r>
+              <a:rPr lang="en-US" sz="1000" dirty="0"/>
+              <a:t>    if match:</a:t>
+            </a:r>
+          </a:p>
+          <a:p>
+            <a:pPr defTabSz="914400">
+              <a:lnSpc>
+                <a:spcPct val="90000"/>
+              </a:lnSpc>
+              <a:spcAft>
+                <a:spcPts val="600"/>
+              </a:spcAft>
+            </a:pPr>
+            <a:r>
+              <a:rPr lang="en-US" sz="1000" dirty="0"/>
+              <a:t>        # Find peak positions</a:t>
+            </a:r>
+          </a:p>
+          <a:p>
+            <a:pPr defTabSz="914400">
+              <a:lnSpc>
+                <a:spcPct val="90000"/>
+              </a:lnSpc>
+              <a:spcAft>
+                <a:spcPts val="600"/>
+              </a:spcAft>
+            </a:pPr>
+            <a:r>
+              <a:rPr lang="en-US" sz="1000" dirty="0"/>
+              <a:t>        </a:t>
+            </a:r>
+            <a:r>
+              <a:rPr lang="en-US" sz="1000" dirty="0" err="1"/>
+              <a:t>max_template_position</a:t>
+            </a:r>
+            <a:r>
+              <a:rPr lang="en-US" sz="1000" dirty="0"/>
+              <a:t> = </a:t>
+            </a:r>
+            <a:r>
+              <a:rPr lang="en-US" sz="1000" dirty="0" err="1"/>
+              <a:t>np.argmax</a:t>
+            </a:r>
+            <a:r>
+              <a:rPr lang="en-US" sz="1000" dirty="0"/>
+              <a:t>(</a:t>
+            </a:r>
+            <a:r>
+              <a:rPr lang="en-US" sz="1000" dirty="0" err="1"/>
+              <a:t>template_sequence</a:t>
+            </a:r>
+            <a:r>
+              <a:rPr lang="en-US" sz="1000" dirty="0"/>
+              <a:t>, axis=0)</a:t>
+            </a:r>
+          </a:p>
+          <a:p>
+            <a:pPr defTabSz="914400">
+              <a:lnSpc>
+                <a:spcPct val="90000"/>
+              </a:lnSpc>
+              <a:spcAft>
+                <a:spcPts val="600"/>
+              </a:spcAft>
+            </a:pPr>
+            <a:r>
+              <a:rPr lang="en-US" sz="1000" dirty="0"/>
+              <a:t>        </a:t>
+            </a:r>
+            <a:r>
+              <a:rPr lang="en-US" sz="1000" dirty="0" err="1"/>
+              <a:t>max_given_position</a:t>
+            </a:r>
+            <a:r>
+              <a:rPr lang="en-US" sz="1000" dirty="0"/>
+              <a:t> = </a:t>
+            </a:r>
+            <a:r>
+              <a:rPr lang="en-US" sz="1000" dirty="0" err="1"/>
+              <a:t>np.argmax</a:t>
+            </a:r>
+            <a:r>
+              <a:rPr lang="en-US" sz="1000" dirty="0"/>
+              <a:t>(</a:t>
+            </a:r>
+            <a:r>
+              <a:rPr lang="en-US" sz="1000" dirty="0" err="1"/>
+              <a:t>given_sequence</a:t>
+            </a:r>
+            <a:r>
+              <a:rPr lang="en-US" sz="1000" dirty="0"/>
+              <a:t>, axis=0)</a:t>
+            </a:r>
+          </a:p>
+          <a:p>
+            <a:pPr defTabSz="914400">
+              <a:lnSpc>
+                <a:spcPct val="90000"/>
+              </a:lnSpc>
+              <a:spcAft>
+                <a:spcPts val="600"/>
+              </a:spcAft>
+            </a:pPr>
+            <a:r>
+              <a:rPr lang="en-US" sz="1000" dirty="0"/>
+              <a:t>        </a:t>
+            </a:r>
+          </a:p>
+          <a:p>
+            <a:pPr defTabSz="914400">
+              <a:lnSpc>
+                <a:spcPct val="90000"/>
+              </a:lnSpc>
+              <a:spcAft>
+                <a:spcPts val="600"/>
+              </a:spcAft>
+            </a:pPr>
+            <a:r>
+              <a:rPr lang="en-US" sz="1000" dirty="0"/>
+              <a:t>        # Extract the x and y coordinates of the matched points</a:t>
+            </a:r>
+          </a:p>
+          <a:p>
+            <a:pPr defTabSz="914400">
+              <a:lnSpc>
+                <a:spcPct val="90000"/>
+              </a:lnSpc>
+              <a:spcAft>
+                <a:spcPts val="600"/>
+              </a:spcAft>
+            </a:pPr>
+            <a:r>
+              <a:rPr lang="en-US" sz="1000" dirty="0"/>
+              <a:t>        </a:t>
+            </a:r>
+            <a:r>
+              <a:rPr lang="en-US" sz="1000" dirty="0" err="1"/>
+              <a:t>matched_x</a:t>
+            </a:r>
+            <a:r>
+              <a:rPr lang="en-US" sz="1000" dirty="0"/>
+              <a:t> = [</a:t>
+            </a:r>
+            <a:r>
+              <a:rPr lang="en-US" sz="1000" dirty="0" err="1"/>
+              <a:t>template_sequence</a:t>
+            </a:r>
+            <a:r>
+              <a:rPr lang="en-US" sz="1000" dirty="0"/>
+              <a:t>[</a:t>
+            </a:r>
+            <a:r>
+              <a:rPr lang="en-US" sz="1000" dirty="0" err="1"/>
+              <a:t>i</a:t>
+            </a:r>
+            <a:r>
+              <a:rPr lang="en-US" sz="1000" dirty="0"/>
+              <a:t>, 0] for </a:t>
+            </a:r>
+            <a:r>
+              <a:rPr lang="en-US" sz="1000" dirty="0" err="1"/>
+              <a:t>i</a:t>
+            </a:r>
+            <a:r>
+              <a:rPr lang="en-US" sz="1000" dirty="0"/>
+              <a:t>, _ in path]</a:t>
+            </a:r>
+          </a:p>
+          <a:p>
+            <a:pPr defTabSz="914400">
+              <a:lnSpc>
+                <a:spcPct val="90000"/>
+              </a:lnSpc>
+              <a:spcAft>
+                <a:spcPts val="600"/>
+              </a:spcAft>
+            </a:pPr>
+            <a:r>
+              <a:rPr lang="en-US" sz="1000" dirty="0"/>
+              <a:t>        </a:t>
+            </a:r>
+            <a:r>
+              <a:rPr lang="en-US" sz="1000" dirty="0" err="1"/>
+              <a:t>matched_y</a:t>
+            </a:r>
+            <a:r>
+              <a:rPr lang="en-US" sz="1000" dirty="0"/>
+              <a:t> = [</a:t>
+            </a:r>
+            <a:r>
+              <a:rPr lang="en-US" sz="1000" dirty="0" err="1"/>
+              <a:t>template_sequence</a:t>
+            </a:r>
+            <a:r>
+              <a:rPr lang="en-US" sz="1000" dirty="0"/>
+              <a:t>[</a:t>
+            </a:r>
+            <a:r>
+              <a:rPr lang="en-US" sz="1000" dirty="0" err="1"/>
+              <a:t>i</a:t>
+            </a:r>
+            <a:r>
+              <a:rPr lang="en-US" sz="1000" dirty="0"/>
+              <a:t>, 1] for </a:t>
+            </a:r>
+            <a:r>
+              <a:rPr lang="en-US" sz="1000" dirty="0" err="1"/>
+              <a:t>i</a:t>
+            </a:r>
+            <a:r>
+              <a:rPr lang="en-US" sz="1000" dirty="0"/>
+              <a:t>, _ in path]</a:t>
+            </a:r>
+          </a:p>
+          <a:p>
+            <a:pPr defTabSz="914400">
+              <a:lnSpc>
+                <a:spcPct val="90000"/>
+              </a:lnSpc>
+              <a:spcAft>
+                <a:spcPts val="600"/>
+              </a:spcAft>
+            </a:pPr>
+            <a:r>
+              <a:rPr lang="en-US" sz="1000" dirty="0"/>
+              <a:t>        </a:t>
+            </a:r>
+          </a:p>
+          <a:p>
+            <a:pPr defTabSz="914400">
+              <a:lnSpc>
+                <a:spcPct val="90000"/>
+              </a:lnSpc>
+              <a:spcAft>
+                <a:spcPts val="600"/>
+              </a:spcAft>
+            </a:pPr>
+            <a:r>
+              <a:rPr lang="en-US" sz="1000" dirty="0"/>
+              <a:t>        # Plot the sequences and highlight the matched points</a:t>
+            </a:r>
+          </a:p>
+          <a:p>
+            <a:pPr defTabSz="914400">
+              <a:lnSpc>
+                <a:spcPct val="90000"/>
+              </a:lnSpc>
+              <a:spcAft>
+                <a:spcPts val="600"/>
+              </a:spcAft>
+            </a:pPr>
+            <a:r>
+              <a:rPr lang="en-US" sz="1000" dirty="0"/>
+              <a:t>        </a:t>
+            </a:r>
+            <a:r>
+              <a:rPr lang="en-US" sz="1000" dirty="0" err="1"/>
+              <a:t>plt.figure</a:t>
+            </a:r>
+            <a:r>
+              <a:rPr lang="en-US" sz="1000" dirty="0"/>
+              <a:t>(</a:t>
+            </a:r>
+            <a:r>
+              <a:rPr lang="en-US" sz="1000" dirty="0" err="1"/>
+              <a:t>figsize</a:t>
+            </a:r>
+            <a:r>
+              <a:rPr lang="en-US" sz="1000" dirty="0"/>
+              <a:t>=(8, 4))</a:t>
+            </a:r>
+          </a:p>
+          <a:p>
+            <a:pPr defTabSz="914400">
+              <a:lnSpc>
+                <a:spcPct val="90000"/>
+              </a:lnSpc>
+              <a:spcAft>
+                <a:spcPts val="600"/>
+              </a:spcAft>
+            </a:pPr>
+            <a:r>
+              <a:rPr lang="en-US" sz="1000" dirty="0"/>
+              <a:t>        </a:t>
+            </a:r>
+            <a:r>
+              <a:rPr lang="en-US" sz="1000" dirty="0" err="1"/>
+              <a:t>plt.plot</a:t>
+            </a:r>
+            <a:r>
+              <a:rPr lang="en-US" sz="1000" dirty="0"/>
+              <a:t>(</a:t>
+            </a:r>
+            <a:r>
+              <a:rPr lang="en-US" sz="1000" dirty="0" err="1"/>
+              <a:t>template_sequence</a:t>
+            </a:r>
+            <a:r>
+              <a:rPr lang="en-US" sz="1000" dirty="0"/>
+              <a:t>[:, 0], </a:t>
+            </a:r>
+            <a:r>
+              <a:rPr lang="en-US" sz="1000" dirty="0" err="1"/>
+              <a:t>template_sequence</a:t>
+            </a:r>
+            <a:r>
+              <a:rPr lang="en-US" sz="1000" dirty="0"/>
+              <a:t>[:, 1], label='Template Sequence', marker='o', </a:t>
+            </a:r>
+            <a:r>
+              <a:rPr lang="en-US" sz="1000" dirty="0" err="1"/>
+              <a:t>markersize</a:t>
+            </a:r>
+            <a:r>
+              <a:rPr lang="en-US" sz="1000" dirty="0"/>
+              <a:t>=5)</a:t>
+            </a:r>
+          </a:p>
+          <a:p>
+            <a:pPr defTabSz="914400">
+              <a:lnSpc>
+                <a:spcPct val="90000"/>
+              </a:lnSpc>
+              <a:spcAft>
+                <a:spcPts val="600"/>
+              </a:spcAft>
+            </a:pPr>
+            <a:r>
+              <a:rPr lang="en-US" sz="1000" dirty="0"/>
+              <a:t>        </a:t>
+            </a:r>
+            <a:r>
+              <a:rPr lang="en-US" sz="1000" dirty="0" err="1"/>
+              <a:t>plt.plot</a:t>
+            </a:r>
+            <a:r>
+              <a:rPr lang="en-US" sz="1000" dirty="0"/>
+              <a:t>(</a:t>
+            </a:r>
+            <a:r>
+              <a:rPr lang="en-US" sz="1000" dirty="0" err="1"/>
+              <a:t>given_sequence</a:t>
+            </a:r>
+            <a:r>
+              <a:rPr lang="en-US" sz="1000" dirty="0"/>
+              <a:t>[:, 0], </a:t>
+            </a:r>
+            <a:r>
+              <a:rPr lang="en-US" sz="1000" dirty="0" err="1"/>
+              <a:t>given_sequence</a:t>
+            </a:r>
+            <a:r>
+              <a:rPr lang="en-US" sz="1000" dirty="0"/>
+              <a:t>[:, 1], label='Given Sequence', marker='x', </a:t>
+            </a:r>
+            <a:r>
+              <a:rPr lang="en-US" sz="1000" dirty="0" err="1"/>
+              <a:t>markersize</a:t>
+            </a:r>
+            <a:r>
+              <a:rPr lang="en-US" sz="1000" dirty="0"/>
+              <a:t>=5)</a:t>
+            </a:r>
+          </a:p>
+          <a:p>
+            <a:pPr defTabSz="914400">
+              <a:lnSpc>
+                <a:spcPct val="90000"/>
+              </a:lnSpc>
+              <a:spcAft>
+                <a:spcPts val="600"/>
+              </a:spcAft>
+            </a:pPr>
+            <a:r>
+              <a:rPr lang="en-US" sz="1000" dirty="0"/>
+              <a:t>        </a:t>
+            </a:r>
+            <a:r>
+              <a:rPr lang="en-US" sz="1000" dirty="0" err="1"/>
+              <a:t>plt.scatter</a:t>
+            </a:r>
+            <a:r>
+              <a:rPr lang="en-US" sz="1000" dirty="0"/>
+              <a:t>(</a:t>
+            </a:r>
+            <a:r>
+              <a:rPr lang="en-US" sz="1000" dirty="0" err="1"/>
+              <a:t>matched_x</a:t>
+            </a:r>
+            <a:r>
+              <a:rPr lang="en-US" sz="1000" dirty="0"/>
+              <a:t>, </a:t>
+            </a:r>
+            <a:r>
+              <a:rPr lang="en-US" sz="1000" dirty="0" err="1"/>
+              <a:t>matched_y</a:t>
+            </a:r>
+            <a:r>
+              <a:rPr lang="en-US" sz="1000" dirty="0"/>
+              <a:t>, c='r', label='Matched Points')  # Plot matched points in red</a:t>
+            </a:r>
+          </a:p>
+          <a:p>
+            <a:pPr defTabSz="914400">
+              <a:lnSpc>
+                <a:spcPct val="90000"/>
+              </a:lnSpc>
+              <a:spcAft>
+                <a:spcPts val="600"/>
+              </a:spcAft>
+            </a:pPr>
+            <a:r>
+              <a:rPr lang="en-US" sz="1000" dirty="0"/>
+              <a:t>        </a:t>
+            </a:r>
+            <a:r>
+              <a:rPr lang="en-US" sz="1000" dirty="0" err="1"/>
+              <a:t>plt.legend</a:t>
+            </a:r>
+            <a:r>
+              <a:rPr lang="en-US" sz="1000" dirty="0"/>
+              <a:t>()</a:t>
+            </a:r>
+          </a:p>
+          <a:p>
+            <a:pPr defTabSz="914400">
+              <a:lnSpc>
+                <a:spcPct val="90000"/>
+              </a:lnSpc>
+              <a:spcAft>
+                <a:spcPts val="600"/>
+              </a:spcAft>
+            </a:pPr>
+            <a:r>
+              <a:rPr lang="en-US" sz="1000" dirty="0"/>
+              <a:t>        </a:t>
+            </a:r>
+            <a:r>
+              <a:rPr lang="en-US" sz="1000" dirty="0" err="1"/>
+              <a:t>plt.title</a:t>
+            </a:r>
+            <a:r>
+              <a:rPr lang="en-US" sz="1000" dirty="0"/>
+              <a:t>(</a:t>
+            </a:r>
+            <a:r>
+              <a:rPr lang="en-US" sz="1000" dirty="0" err="1"/>
+              <a:t>f"Matching</a:t>
+            </a:r>
+            <a:r>
+              <a:rPr lang="en-US" sz="1000" dirty="0"/>
+              <a:t> Result with {</a:t>
+            </a:r>
+            <a:r>
+              <a:rPr lang="en-US" sz="1000" dirty="0" err="1"/>
+              <a:t>template_filename</a:t>
+            </a:r>
+            <a:r>
+              <a:rPr lang="en-US" sz="1000" dirty="0"/>
+              <a:t>} (DTW Distance: {distance})")</a:t>
+            </a:r>
+          </a:p>
+          <a:p>
+            <a:pPr defTabSz="914400">
+              <a:lnSpc>
+                <a:spcPct val="90000"/>
+              </a:lnSpc>
+              <a:spcAft>
+                <a:spcPts val="600"/>
+              </a:spcAft>
+            </a:pPr>
+            <a:r>
+              <a:rPr lang="en-US" sz="1000" dirty="0"/>
+              <a:t>        </a:t>
+            </a:r>
+            <a:r>
+              <a:rPr lang="en-US" sz="1000" dirty="0" err="1"/>
+              <a:t>plt.xlabel</a:t>
+            </a:r>
+            <a:r>
+              <a:rPr lang="en-US" sz="1000" dirty="0"/>
+              <a:t>("X")</a:t>
+            </a:r>
+          </a:p>
+          <a:p>
+            <a:pPr defTabSz="914400">
+              <a:lnSpc>
+                <a:spcPct val="90000"/>
+              </a:lnSpc>
+              <a:spcAft>
+                <a:spcPts val="600"/>
+              </a:spcAft>
+            </a:pPr>
+            <a:r>
+              <a:rPr lang="en-US" sz="1000" dirty="0"/>
+              <a:t>        </a:t>
+            </a:r>
+            <a:r>
+              <a:rPr lang="en-US" sz="1000" dirty="0" err="1"/>
+              <a:t>plt.ylabel</a:t>
+            </a:r>
+            <a:r>
+              <a:rPr lang="en-US" sz="1000" dirty="0"/>
+              <a:t>("Y")</a:t>
+            </a:r>
+          </a:p>
+          <a:p>
+            <a:pPr defTabSz="914400">
+              <a:lnSpc>
+                <a:spcPct val="90000"/>
+              </a:lnSpc>
+              <a:spcAft>
+                <a:spcPts val="600"/>
+              </a:spcAft>
+            </a:pPr>
+            <a:r>
+              <a:rPr lang="en-US" sz="1000" dirty="0"/>
+              <a:t>        </a:t>
+            </a:r>
+            <a:r>
+              <a:rPr lang="en-US" sz="1000" dirty="0" err="1"/>
+              <a:t>plt.show</a:t>
+            </a:r>
+            <a:r>
+              <a:rPr lang="en-US" sz="1000" dirty="0"/>
+              <a:t>()</a:t>
+            </a:r>
+          </a:p>
+          <a:p>
+            <a:pPr defTabSz="914400">
+              <a:lnSpc>
+                <a:spcPct val="90000"/>
+              </a:lnSpc>
+              <a:spcAft>
+                <a:spcPts val="600"/>
+              </a:spcAft>
+            </a:pPr>
+            <a:endParaRPr lang="en-US" sz="1000" dirty="0"/>
+          </a:p>
+          <a:p>
+            <a:pPr defTabSz="914400">
+              <a:lnSpc>
+                <a:spcPct val="90000"/>
+              </a:lnSpc>
+              <a:spcAft>
+                <a:spcPts val="600"/>
+              </a:spcAft>
+            </a:pPr>
+            <a:r>
+              <a:rPr lang="en-US" sz="1000" dirty="0">
+                <a:hlinkClick r:id="rId2"/>
+              </a:rPr>
+              <a:t>GITHUB Link</a:t>
+            </a:r>
+            <a:endParaRPr lang="en-US" sz="1000" dirty="0"/>
+          </a:p>
+        </p:txBody>
+      </p:sp>
+    </p:spTree>
+    <p:extLst>
+      <p:ext uri="{BB962C8B-B14F-4D97-AF65-F5344CB8AC3E}">
+        <p14:creationId xmlns:p14="http://schemas.microsoft.com/office/powerpoint/2010/main" val="2815950642"/>
+      </p:ext>
+    </p:extLst>
+  </p:cSld>
+  <p:clrMapOvr>
+    <a:masterClrMapping/>
+  </p:clrMapOvr>
+</p:sld>
+</file>
+
+<file path=ppt/slides/slide12.xml><?xml version="1.0" encoding="utf-8"?>
+<p:sld xmlns:a="http://schemas.openxmlformats.org/drawingml/2006/main" xmlns:r="http://schemas.openxmlformats.org/officeDocument/2006/relationships" xmlns:p="http://schemas.openxmlformats.org/presentationml/2006/main">
+  <p:cSld>
+    <p:bg>
+      <p:bgPr>
+        <a:gradFill rotWithShape="1">
+          <a:gsLst>
+            <a:gs pos="0">
+              <a:schemeClr val="bg1">
+                <a:tint val="93000"/>
+                <a:shade val="98000"/>
+                <a:satMod val="150000"/>
+                <a:lumMod val="102000"/>
+              </a:schemeClr>
+            </a:gs>
+            <a:gs pos="50000">
+              <a:schemeClr val="bg1">
+                <a:tint val="98000"/>
+                <a:shade val="90000"/>
+                <a:satMod val="130000"/>
+                <a:lumMod val="103000"/>
+              </a:schemeClr>
+            </a:gs>
+            <a:gs pos="100000">
+              <a:schemeClr val="bg1">
+                <a:shade val="63000"/>
+                <a:satMod val="120000"/>
+              </a:schemeClr>
+            </a:gs>
+          </a:gsLst>
+          <a:lin ang="5400000" scaled="0"/>
+        </a:gradFill>
+        <a:effectLst/>
+      </p:bgPr>
+    </p:bg>
+    <p:spTree>
+      <p:nvGrpSpPr>
+        <p:cNvPr id="1" name=""/>
+        <p:cNvGrpSpPr/>
+        <p:nvPr/>
+      </p:nvGrpSpPr>
+      <p:grpSpPr>
+        <a:xfrm>
+          <a:off x="0" y="0"/>
+          <a:ext cx="0" cy="0"/>
+          <a:chOff x="0" y="0"/>
+          <a:chExt cx="0" cy="0"/>
+        </a:xfrm>
+      </p:grpSpPr>
+      <p:sp useBgFill="1">
+        <p:nvSpPr>
+          <p:cNvPr id="12" name="Rectangle 11">
+            <a:extLst>
+              <a:ext uri="{FF2B5EF4-FFF2-40B4-BE49-F238E27FC236}">
+                <a16:creationId xmlns:a16="http://schemas.microsoft.com/office/drawing/2014/main" id="{24C41CF4-4A13-4AA9-9300-CB7A2E37C861}"/>
+              </a:ext>
+              <a:ext uri="{C183D7F6-B498-43B3-948B-1728B52AA6E4}">
+                <adec:decorative xmlns:adec="http://schemas.microsoft.com/office/drawing/2017/decorative" val="1"/>
+              </a:ext>
+            </a:extLst>
+          </p:cNvPr>
+          <p:cNvSpPr>
+            <a:spLocks noGrp="1" noRot="1" noChangeAspect="1" noMove="1" noResize="1" noEditPoints="1" noAdjustHandles="1" noChangeArrowheads="1" noChangeShapeType="1" noTextEdit="1"/>
+          </p:cNvSpPr>
+          <p:nvPr>
+            <p:extLst>
+              <p:ext uri="{386F3935-93C4-4BCD-93E2-E3B085C9AB24}">
+                <p16:designElem xmlns:p16="http://schemas.microsoft.com/office/powerpoint/2015/main" val="1"/>
+              </p:ext>
+            </p:extLst>
+          </p:nvPr>
+        </p:nvSpPr>
+        <p:spPr>
+          <a:xfrm>
+            <a:off x="1" y="0"/>
+            <a:ext cx="12192000" cy="6858000"/>
+          </a:xfrm>
+          <a:prstGeom prst="rect">
+            <a:avLst/>
+          </a:prstGeom>
+          <a:ln>
+            <a:noFill/>
+          </a:ln>
+          <a:effectLst/>
+        </p:spPr>
+        <p:style>
+          <a:lnRef idx="2">
+            <a:schemeClr val="accent1">
+              <a:shade val="50000"/>
+            </a:schemeClr>
+          </a:lnRef>
+          <a:fillRef idx="1">
+            <a:schemeClr val="accent1"/>
+          </a:fillRef>
+          <a:effectRef idx="0">
+            <a:schemeClr val="accent1"/>
+          </a:effectRef>
+          <a:fontRef idx="minor">
+            <a:schemeClr val="lt1"/>
+          </a:fontRef>
+        </p:style>
+        <p:txBody>
+          <a:bodyPr rtlCol="0" anchor="ctr"/>
+          <a:lstStyle/>
+          <a:p>
+            <a:pPr marL="0" marR="0" lvl="0" indent="0" algn="ctr" defTabSz="457200" rtl="0" eaLnBrk="1" fontAlgn="auto" latinLnBrk="0" hangingPunct="1">
+              <a:lnSpc>
+                <a:spcPct val="100000"/>
+              </a:lnSpc>
+              <a:spcBef>
+                <a:spcPts val="0"/>
+              </a:spcBef>
+              <a:spcAft>
+                <a:spcPts val="0"/>
+              </a:spcAft>
+              <a:buClrTx/>
+              <a:buSzTx/>
+              <a:buFontTx/>
+              <a:buNone/>
+              <a:tabLst/>
+              <a:defRPr/>
+            </a:pPr>
+            <a:endParaRPr kumimoji="0" lang="en-US" sz="1800" b="0" i="0" u="none" strike="noStrike" kern="1200" cap="none" spc="0" normalizeH="0" baseline="0" noProof="0">
+              <a:ln>
+                <a:noFill/>
+              </a:ln>
+              <a:solidFill>
+                <a:prstClr val="white"/>
+              </a:solidFill>
+              <a:effectLst/>
+              <a:uLnTx/>
+              <a:uFillTx/>
+              <a:latin typeface="Century Gothic" panose="020B0502020202020204"/>
+              <a:ea typeface="+mn-ea"/>
+              <a:cs typeface="+mn-cs"/>
+            </a:endParaRPr>
+          </a:p>
+        </p:txBody>
+      </p:sp>
+      <p:sp>
+        <p:nvSpPr>
+          <p:cNvPr id="5" name="TextBox 4">
+            <a:extLst>
+              <a:ext uri="{FF2B5EF4-FFF2-40B4-BE49-F238E27FC236}">
                 <a16:creationId xmlns:a16="http://schemas.microsoft.com/office/drawing/2014/main" id="{68908514-8A97-2989-307B-0F331C9AC49B}"/>
               </a:ext>
             </a:extLst>
@@ -13370,6 +13809,86 @@
     <p:extLst>
       <p:ext uri="{BB962C8B-B14F-4D97-AF65-F5344CB8AC3E}">
         <p14:creationId xmlns:p14="http://schemas.microsoft.com/office/powerpoint/2010/main" val="3990531705"/>
+      </p:ext>
+    </p:extLst>
+  </p:cSld>
+  <p:clrMapOvr>
+    <a:masterClrMapping/>
+  </p:clrMapOvr>
+</p:sld>
+</file>
+
+<file path=ppt/slides/slide13.xml><?xml version="1.0" encoding="utf-8"?>
+<p:sld xmlns:a="http://schemas.openxmlformats.org/drawingml/2006/main" xmlns:r="http://schemas.openxmlformats.org/officeDocument/2006/relationships" xmlns:p="http://schemas.openxmlformats.org/presentationml/2006/main">
+  <p:cSld>
+    <p:spTree>
+      <p:nvGrpSpPr>
+        <p:cNvPr id="1" name=""/>
+        <p:cNvGrpSpPr/>
+        <p:nvPr/>
+      </p:nvGrpSpPr>
+      <p:grpSpPr>
+        <a:xfrm>
+          <a:off x="0" y="0"/>
+          <a:ext cx="0" cy="0"/>
+          <a:chOff x="0" y="0"/>
+          <a:chExt cx="0" cy="0"/>
+        </a:xfrm>
+      </p:grpSpPr>
+      <p:sp>
+        <p:nvSpPr>
+          <p:cNvPr id="2" name="Title 1">
+            <a:extLst>
+              <a:ext uri="{FF2B5EF4-FFF2-40B4-BE49-F238E27FC236}">
+                <a16:creationId xmlns:a16="http://schemas.microsoft.com/office/drawing/2014/main" id="{6017601B-C2CF-D540-588D-827FBC5AF4DC}"/>
+              </a:ext>
+            </a:extLst>
+          </p:cNvPr>
+          <p:cNvSpPr>
+            <a:spLocks noGrp="1"/>
+          </p:cNvSpPr>
+          <p:nvPr>
+            <p:ph type="title"/>
+          </p:nvPr>
+        </p:nvSpPr>
+        <p:spPr/>
+        <p:txBody>
+          <a:bodyPr/>
+          <a:lstStyle/>
+          <a:p>
+            <a:endParaRPr lang="en-IN"/>
+          </a:p>
+        </p:txBody>
+      </p:sp>
+      <p:sp>
+        <p:nvSpPr>
+          <p:cNvPr id="3" name="Content Placeholder 2">
+            <a:extLst>
+              <a:ext uri="{FF2B5EF4-FFF2-40B4-BE49-F238E27FC236}">
+                <a16:creationId xmlns:a16="http://schemas.microsoft.com/office/drawing/2014/main" id="{724822E9-74F0-46AA-F6EA-9612270A7F58}"/>
+              </a:ext>
+            </a:extLst>
+          </p:cNvPr>
+          <p:cNvSpPr>
+            <a:spLocks noGrp="1"/>
+          </p:cNvSpPr>
+          <p:nvPr>
+            <p:ph idx="1"/>
+          </p:nvPr>
+        </p:nvSpPr>
+        <p:spPr/>
+        <p:txBody>
+          <a:bodyPr/>
+          <a:lstStyle/>
+          <a:p>
+            <a:endParaRPr lang="en-IN"/>
+          </a:p>
+        </p:txBody>
+      </p:sp>
+    </p:spTree>
+    <p:extLst>
+      <p:ext uri="{BB962C8B-B14F-4D97-AF65-F5344CB8AC3E}">
+        <p14:creationId xmlns:p14="http://schemas.microsoft.com/office/powerpoint/2010/main" val="3176809890"/>
       </p:ext>
     </p:extLst>
   </p:cSld>
@@ -14408,7 +14927,7 @@
           <p:nvPr>
             <p:extLst>
               <p:ext uri="{D42A27DB-BD31-4B8C-83A1-F6EECF244321}">
-                <p14:modId xmlns:p14="http://schemas.microsoft.com/office/powerpoint/2010/main" val="3435030549"/>
+                <p14:modId xmlns:p14="http://schemas.microsoft.com/office/powerpoint/2010/main" val="1401624713"/>
               </p:ext>
             </p:extLst>
           </p:nvPr>
@@ -14437,6 +14956,86 @@
 </file>
 
 <file path=ppt/slides/slide7.xml><?xml version="1.0" encoding="utf-8"?>
+<p:sld xmlns:a="http://schemas.openxmlformats.org/drawingml/2006/main" xmlns:r="http://schemas.openxmlformats.org/officeDocument/2006/relationships" xmlns:p="http://schemas.openxmlformats.org/presentationml/2006/main">
+  <p:cSld>
+    <p:spTree>
+      <p:nvGrpSpPr>
+        <p:cNvPr id="1" name=""/>
+        <p:cNvGrpSpPr/>
+        <p:nvPr/>
+      </p:nvGrpSpPr>
+      <p:grpSpPr>
+        <a:xfrm>
+          <a:off x="0" y="0"/>
+          <a:ext cx="0" cy="0"/>
+          <a:chOff x="0" y="0"/>
+          <a:chExt cx="0" cy="0"/>
+        </a:xfrm>
+      </p:grpSpPr>
+      <p:sp>
+        <p:nvSpPr>
+          <p:cNvPr id="2" name="Title 1">
+            <a:extLst>
+              <a:ext uri="{FF2B5EF4-FFF2-40B4-BE49-F238E27FC236}">
+                <a16:creationId xmlns:a16="http://schemas.microsoft.com/office/drawing/2014/main" id="{043F45CB-4CC0-3E8B-BC26-D8DCD70B2E58}"/>
+              </a:ext>
+            </a:extLst>
+          </p:cNvPr>
+          <p:cNvSpPr>
+            <a:spLocks noGrp="1"/>
+          </p:cNvSpPr>
+          <p:nvPr>
+            <p:ph type="title"/>
+          </p:nvPr>
+        </p:nvSpPr>
+        <p:spPr/>
+        <p:txBody>
+          <a:bodyPr/>
+          <a:lstStyle/>
+          <a:p>
+            <a:endParaRPr lang="en-IN"/>
+          </a:p>
+        </p:txBody>
+      </p:sp>
+      <p:sp>
+        <p:nvSpPr>
+          <p:cNvPr id="3" name="Content Placeholder 2">
+            <a:extLst>
+              <a:ext uri="{FF2B5EF4-FFF2-40B4-BE49-F238E27FC236}">
+                <a16:creationId xmlns:a16="http://schemas.microsoft.com/office/drawing/2014/main" id="{67A617C5-4A79-792B-2C23-7D5D298666BB}"/>
+              </a:ext>
+            </a:extLst>
+          </p:cNvPr>
+          <p:cNvSpPr>
+            <a:spLocks noGrp="1"/>
+          </p:cNvSpPr>
+          <p:nvPr>
+            <p:ph idx="1"/>
+          </p:nvPr>
+        </p:nvSpPr>
+        <p:spPr/>
+        <p:txBody>
+          <a:bodyPr/>
+          <a:lstStyle/>
+          <a:p>
+            <a:endParaRPr lang="en-IN"/>
+          </a:p>
+        </p:txBody>
+      </p:sp>
+    </p:spTree>
+    <p:extLst>
+      <p:ext uri="{BB962C8B-B14F-4D97-AF65-F5344CB8AC3E}">
+        <p14:creationId xmlns:p14="http://schemas.microsoft.com/office/powerpoint/2010/main" val="4134696073"/>
+      </p:ext>
+    </p:extLst>
+  </p:cSld>
+  <p:clrMapOvr>
+    <a:masterClrMapping/>
+  </p:clrMapOvr>
+</p:sld>
+</file>
+
+<file path=ppt/slides/slide8.xml><?xml version="1.0" encoding="utf-8"?>
 <p:sld xmlns:a="http://schemas.openxmlformats.org/drawingml/2006/main" xmlns:r="http://schemas.openxmlformats.org/officeDocument/2006/relationships" xmlns:p="http://schemas.openxmlformats.org/presentationml/2006/main">
   <p:cSld>
     <p:bg>
@@ -14867,7 +15466,7 @@
 </p:sld>
 </file>
 
-<file path=ppt/slides/slide8.xml><?xml version="1.0" encoding="utf-8"?>
+<file path=ppt/slides/slide9.xml><?xml version="1.0" encoding="utf-8"?>
 <p:sld xmlns:a="http://schemas.openxmlformats.org/drawingml/2006/main" xmlns:r="http://schemas.openxmlformats.org/officeDocument/2006/relationships" xmlns:p="http://schemas.openxmlformats.org/presentationml/2006/main">
   <p:cSld>
     <p:bg>
@@ -15588,438 +16187,6 @@
     <p:extLst>
       <p:ext uri="{BB962C8B-B14F-4D97-AF65-F5344CB8AC3E}">
         <p14:creationId xmlns:p14="http://schemas.microsoft.com/office/powerpoint/2010/main" val="1468208001"/>
-      </p:ext>
-    </p:extLst>
-  </p:cSld>
-  <p:clrMapOvr>
-    <a:masterClrMapping/>
-  </p:clrMapOvr>
-</p:sld>
-</file>
-
-<file path=ppt/slides/slide9.xml><?xml version="1.0" encoding="utf-8"?>
-<p:sld xmlns:a="http://schemas.openxmlformats.org/drawingml/2006/main" xmlns:r="http://schemas.openxmlformats.org/officeDocument/2006/relationships" xmlns:p="http://schemas.openxmlformats.org/presentationml/2006/main">
-  <p:cSld>
-    <p:bg>
-      <p:bgPr>
-        <a:solidFill>
-          <a:schemeClr val="bg1"/>
-        </a:solidFill>
-        <a:effectLst/>
-      </p:bgPr>
-    </p:bg>
-    <p:spTree>
-      <p:nvGrpSpPr>
-        <p:cNvPr id="1" name=""/>
-        <p:cNvGrpSpPr/>
-        <p:nvPr/>
-      </p:nvGrpSpPr>
-      <p:grpSpPr>
-        <a:xfrm>
-          <a:off x="0" y="0"/>
-          <a:ext cx="0" cy="0"/>
-          <a:chOff x="0" y="0"/>
-          <a:chExt cx="0" cy="0"/>
-        </a:xfrm>
-      </p:grpSpPr>
-      <p:sp>
-        <p:nvSpPr>
-          <p:cNvPr id="13" name="Rectangle 12">
-            <a:extLst>
-              <a:ext uri="{FF2B5EF4-FFF2-40B4-BE49-F238E27FC236}">
-                <a16:creationId xmlns:a16="http://schemas.microsoft.com/office/drawing/2014/main" id="{1EA5387D-64D8-4D6C-B109-FF4E81DF609A}"/>
-              </a:ext>
-              <a:ext uri="{C183D7F6-B498-43B3-948B-1728B52AA6E4}">
-                <adec:decorative xmlns:adec="http://schemas.microsoft.com/office/drawing/2017/decorative" val="1"/>
-              </a:ext>
-            </a:extLst>
-          </p:cNvPr>
-          <p:cNvSpPr>
-            <a:spLocks noGrp="1" noRot="1" noChangeAspect="1" noMove="1" noResize="1" noEditPoints="1" noAdjustHandles="1" noChangeArrowheads="1" noChangeShapeType="1" noTextEdit="1"/>
-          </p:cNvSpPr>
-          <p:nvPr>
-            <p:extLst>
-              <p:ext uri="{386F3935-93C4-4BCD-93E2-E3B085C9AB24}">
-                <p16:designElem xmlns:p16="http://schemas.microsoft.com/office/powerpoint/2015/main" val="1"/>
-              </p:ext>
-            </p:extLst>
-          </p:nvPr>
-        </p:nvSpPr>
-        <p:spPr>
-          <a:xfrm>
-            <a:off x="0" y="0"/>
-            <a:ext cx="12192000" cy="6858000"/>
-          </a:xfrm>
-          <a:prstGeom prst="rect">
-            <a:avLst/>
-          </a:prstGeom>
-          <a:solidFill>
-            <a:schemeClr val="bg1"/>
-          </a:solidFill>
-          <a:ln>
-            <a:noFill/>
-          </a:ln>
-        </p:spPr>
-        <p:style>
-          <a:lnRef idx="2">
-            <a:schemeClr val="accent1">
-              <a:shade val="50000"/>
-            </a:schemeClr>
-          </a:lnRef>
-          <a:fillRef idx="1">
-            <a:schemeClr val="accent1"/>
-          </a:fillRef>
-          <a:effectRef idx="0">
-            <a:schemeClr val="accent1"/>
-          </a:effectRef>
-          <a:fontRef idx="minor">
-            <a:schemeClr val="lt1"/>
-          </a:fontRef>
-        </p:style>
-        <p:txBody>
-          <a:bodyPr rtlCol="0" anchor="ctr"/>
-          <a:lstStyle/>
-          <a:p>
-            <a:pPr algn="ctr"/>
-            <a:endParaRPr lang="en-US"/>
-          </a:p>
-        </p:txBody>
-      </p:sp>
-      <p:pic>
-        <p:nvPicPr>
-          <p:cNvPr id="9" name="Picture 8" descr="A group of glowing rings&#10;&#10;Description automatically generated with medium confidence">
-            <a:extLst>
-              <a:ext uri="{FF2B5EF4-FFF2-40B4-BE49-F238E27FC236}">
-                <a16:creationId xmlns:a16="http://schemas.microsoft.com/office/drawing/2014/main" id="{646C0CD6-138A-A71B-744A-E5BCA461E42F}"/>
-              </a:ext>
-            </a:extLst>
-          </p:cNvPr>
-          <p:cNvPicPr>
-            <a:picLocks noChangeAspect="1"/>
-          </p:cNvPicPr>
-          <p:nvPr/>
-        </p:nvPicPr>
-        <p:blipFill rotWithShape="1">
-          <a:blip r:embed="rId2">
-            <a:duotone>
-              <a:schemeClr val="bg2">
-                <a:shade val="45000"/>
-                <a:satMod val="135000"/>
-              </a:schemeClr>
-              <a:prstClr val="white"/>
-            </a:duotone>
-            <a:alphaModFix amt="30000"/>
-          </a:blip>
-          <a:srcRect t="2868" b="13177"/>
-          <a:stretch/>
-        </p:blipFill>
-        <p:spPr>
-          <a:xfrm>
-            <a:off x="20" y="10"/>
-            <a:ext cx="12191980" cy="6857990"/>
-          </a:xfrm>
-          <a:prstGeom prst="rect">
-            <a:avLst/>
-          </a:prstGeom>
-        </p:spPr>
-      </p:pic>
-      <p:sp>
-        <p:nvSpPr>
-          <p:cNvPr id="5" name="TextBox 4">
-            <a:extLst>
-              <a:ext uri="{FF2B5EF4-FFF2-40B4-BE49-F238E27FC236}">
-                <a16:creationId xmlns:a16="http://schemas.microsoft.com/office/drawing/2014/main" id="{F3BC1F92-2958-AE2E-B00A-8B98066C68FB}"/>
-              </a:ext>
-            </a:extLst>
-          </p:cNvPr>
-          <p:cNvSpPr txBox="1"/>
-          <p:nvPr/>
-        </p:nvSpPr>
-        <p:spPr>
-          <a:xfrm>
-            <a:off x="2895600" y="764373"/>
-            <a:ext cx="8610600" cy="1293028"/>
-          </a:xfrm>
-          <a:prstGeom prst="rect">
-            <a:avLst/>
-          </a:prstGeom>
-        </p:spPr>
-        <p:txBody>
-          <a:bodyPr vert="horz" lIns="91440" tIns="45720" rIns="91440" bIns="45720" rtlCol="0" anchor="ctr">
-            <a:normAutofit/>
-          </a:bodyPr>
-          <a:lstStyle/>
-          <a:p>
-            <a:pPr algn="r" defTabSz="914400">
-              <a:lnSpc>
-                <a:spcPct val="90000"/>
-              </a:lnSpc>
-              <a:spcBef>
-                <a:spcPct val="0"/>
-              </a:spcBef>
-              <a:spcAft>
-                <a:spcPts val="600"/>
-              </a:spcAft>
-            </a:pPr>
-            <a:r>
-              <a:rPr lang="en-US" sz="4000" b="1" i="0" cap="all">
-                <a:effectLst/>
-                <a:latin typeface="+mj-lt"/>
-                <a:ea typeface="+mj-ea"/>
-                <a:cs typeface="+mj-cs"/>
-              </a:rPr>
-              <a:t>Dynamic Time Warping (DTW):</a:t>
-            </a:r>
-            <a:endParaRPr lang="en-US" sz="4000" cap="all">
-              <a:latin typeface="+mj-lt"/>
-              <a:ea typeface="+mj-ea"/>
-              <a:cs typeface="+mj-cs"/>
-            </a:endParaRPr>
-          </a:p>
-        </p:txBody>
-      </p:sp>
-      <p:sp>
-        <p:nvSpPr>
-          <p:cNvPr id="7" name="TextBox 6">
-            <a:extLst>
-              <a:ext uri="{FF2B5EF4-FFF2-40B4-BE49-F238E27FC236}">
-                <a16:creationId xmlns:a16="http://schemas.microsoft.com/office/drawing/2014/main" id="{80F7466D-9AE1-398B-00AF-5FC9355691A2}"/>
-              </a:ext>
-            </a:extLst>
-          </p:cNvPr>
-          <p:cNvSpPr txBox="1"/>
-          <p:nvPr/>
-        </p:nvSpPr>
-        <p:spPr>
-          <a:xfrm>
-            <a:off x="685800" y="2194560"/>
-            <a:ext cx="10820400" cy="4024125"/>
-          </a:xfrm>
-          <a:prstGeom prst="rect">
-            <a:avLst/>
-          </a:prstGeom>
-        </p:spPr>
-        <p:txBody>
-          <a:bodyPr vert="horz" lIns="91440" tIns="45720" rIns="91440" bIns="45720" rtlCol="0">
-            <a:normAutofit/>
-          </a:bodyPr>
-          <a:lstStyle/>
-          <a:p>
-            <a:pPr defTabSz="914400">
-              <a:lnSpc>
-                <a:spcPct val="90000"/>
-              </a:lnSpc>
-              <a:spcAft>
-                <a:spcPts val="600"/>
-              </a:spcAft>
-            </a:pPr>
-            <a:r>
-              <a:rPr lang="en-US" dirty="0"/>
-              <a:t># Function to perform DTW shape matching</a:t>
-            </a:r>
-          </a:p>
-          <a:p>
-            <a:pPr defTabSz="914400">
-              <a:lnSpc>
-                <a:spcPct val="90000"/>
-              </a:lnSpc>
-              <a:spcAft>
-                <a:spcPts val="600"/>
-              </a:spcAft>
-            </a:pPr>
-            <a:r>
-              <a:rPr lang="en-US" dirty="0"/>
-              <a:t>def </a:t>
-            </a:r>
-            <a:r>
-              <a:rPr lang="en-US" dirty="0" err="1"/>
-              <a:t>shape_matching</a:t>
-            </a:r>
-            <a:r>
-              <a:rPr lang="en-US" dirty="0"/>
-              <a:t>(</a:t>
-            </a:r>
-            <a:r>
-              <a:rPr lang="en-US" dirty="0" err="1"/>
-              <a:t>template_sequence</a:t>
-            </a:r>
-            <a:r>
-              <a:rPr lang="en-US" dirty="0"/>
-              <a:t>, </a:t>
-            </a:r>
-            <a:r>
-              <a:rPr lang="en-US" dirty="0" err="1"/>
-              <a:t>target_sequence</a:t>
-            </a:r>
-            <a:r>
-              <a:rPr lang="en-US" dirty="0"/>
-              <a:t>, threshold):</a:t>
-            </a:r>
-          </a:p>
-          <a:p>
-            <a:pPr defTabSz="914400">
-              <a:lnSpc>
-                <a:spcPct val="90000"/>
-              </a:lnSpc>
-              <a:spcAft>
-                <a:spcPts val="600"/>
-              </a:spcAft>
-            </a:pPr>
-            <a:r>
-              <a:rPr lang="en-US" dirty="0"/>
-              <a:t>    # Compute the DTW distance between the sequences</a:t>
-            </a:r>
-          </a:p>
-          <a:p>
-            <a:pPr defTabSz="914400">
-              <a:lnSpc>
-                <a:spcPct val="90000"/>
-              </a:lnSpc>
-              <a:spcAft>
-                <a:spcPts val="600"/>
-              </a:spcAft>
-            </a:pPr>
-            <a:r>
-              <a:rPr lang="en-US" dirty="0"/>
-              <a:t>    distance, _ = </a:t>
-            </a:r>
-            <a:r>
-              <a:rPr lang="en-US" dirty="0" err="1"/>
-              <a:t>fastdtw</a:t>
-            </a:r>
-            <a:r>
-              <a:rPr lang="en-US" dirty="0"/>
-              <a:t>(</a:t>
-            </a:r>
-            <a:r>
-              <a:rPr lang="en-US" dirty="0" err="1"/>
-              <a:t>template_sequence</a:t>
-            </a:r>
-            <a:r>
-              <a:rPr lang="en-US" dirty="0"/>
-              <a:t>, </a:t>
-            </a:r>
-            <a:r>
-              <a:rPr lang="en-US" dirty="0" err="1"/>
-              <a:t>target_sequence</a:t>
-            </a:r>
-            <a:r>
-              <a:rPr lang="en-US" dirty="0"/>
-              <a:t>)</a:t>
-            </a:r>
-          </a:p>
-          <a:p>
-            <a:pPr defTabSz="914400">
-              <a:lnSpc>
-                <a:spcPct val="90000"/>
-              </a:lnSpc>
-              <a:spcAft>
-                <a:spcPts val="600"/>
-              </a:spcAft>
-            </a:pPr>
-            <a:endParaRPr lang="en-US" dirty="0"/>
-          </a:p>
-          <a:p>
-            <a:pPr defTabSz="914400">
-              <a:lnSpc>
-                <a:spcPct val="90000"/>
-              </a:lnSpc>
-              <a:spcAft>
-                <a:spcPts val="600"/>
-              </a:spcAft>
-            </a:pPr>
-            <a:r>
-              <a:rPr lang="en-US" dirty="0"/>
-              <a:t>    if distance &lt; threshold:</a:t>
-            </a:r>
-          </a:p>
-          <a:p>
-            <a:pPr defTabSz="914400">
-              <a:lnSpc>
-                <a:spcPct val="90000"/>
-              </a:lnSpc>
-              <a:spcAft>
-                <a:spcPts val="600"/>
-              </a:spcAft>
-            </a:pPr>
-            <a:r>
-              <a:rPr lang="en-US" dirty="0"/>
-              <a:t>        return True, distance</a:t>
-            </a:r>
-          </a:p>
-          <a:p>
-            <a:pPr defTabSz="914400">
-              <a:lnSpc>
-                <a:spcPct val="90000"/>
-              </a:lnSpc>
-              <a:spcAft>
-                <a:spcPts val="600"/>
-              </a:spcAft>
-            </a:pPr>
-            <a:r>
-              <a:rPr lang="en-US" dirty="0"/>
-              <a:t>    else:</a:t>
-            </a:r>
-          </a:p>
-          <a:p>
-            <a:pPr defTabSz="914400">
-              <a:lnSpc>
-                <a:spcPct val="90000"/>
-              </a:lnSpc>
-              <a:spcAft>
-                <a:spcPts val="600"/>
-              </a:spcAft>
-            </a:pPr>
-            <a:r>
-              <a:rPr lang="en-US" dirty="0"/>
-              <a:t>        return False, distance</a:t>
-            </a:r>
-          </a:p>
-          <a:p>
-            <a:pPr defTabSz="914400">
-              <a:lnSpc>
-                <a:spcPct val="90000"/>
-              </a:lnSpc>
-              <a:spcAft>
-                <a:spcPts val="600"/>
-              </a:spcAft>
-            </a:pPr>
-            <a:endParaRPr lang="en-US" dirty="0"/>
-          </a:p>
-          <a:p>
-            <a:pPr defTabSz="914400">
-              <a:lnSpc>
-                <a:spcPct val="90000"/>
-              </a:lnSpc>
-              <a:spcAft>
-                <a:spcPts val="600"/>
-              </a:spcAft>
-            </a:pPr>
-            <a:endParaRPr lang="en-US" dirty="0"/>
-          </a:p>
-          <a:p>
-            <a:pPr defTabSz="914400">
-              <a:lnSpc>
-                <a:spcPct val="90000"/>
-              </a:lnSpc>
-              <a:spcAft>
-                <a:spcPts val="600"/>
-              </a:spcAft>
-            </a:pPr>
-            <a:r>
-              <a:rPr lang="en-US" dirty="0">
-                <a:hlinkClick r:id="rId3"/>
-              </a:rPr>
-              <a:t>GITHUB Link</a:t>
-            </a:r>
-            <a:endParaRPr lang="en-US" dirty="0"/>
-          </a:p>
-        </p:txBody>
-      </p:sp>
-    </p:spTree>
-    <p:extLst>
-      <p:ext uri="{BB962C8B-B14F-4D97-AF65-F5344CB8AC3E}">
-        <p14:creationId xmlns:p14="http://schemas.microsoft.com/office/powerpoint/2010/main" val="3988142864"/>
       </p:ext>
     </p:extLst>
   </p:cSld>

</xml_diff>